<commit_message>
paper research 자료 제작 중
</commit_message>
<xml_diff>
--- a/papers/papersForKCC/논문 관련 조사 및 아이디어.pptx
+++ b/papers/papersForKCC/논문 관련 조사 및 아이디어.pptx
@@ -8891,17 +8891,100 @@
               <a:buFont typeface="Wingdings" panose="05000000000000000000" pitchFamily="2" charset="2"/>
               <a:buChar char="§"/>
             </a:pPr>
-            <a:endParaRPr lang="en-US" altLang="ko-KR" sz="1800" dirty="0">
-              <a:solidFill>
-                <a:schemeClr val="tx1">
-                  <a:lumMod val="85000"/>
-                  <a:lumOff val="15000"/>
-                </a:schemeClr>
-              </a:solidFill>
-              <a:latin typeface="나눔스퀘어 ExtraBold" panose="020B0600000101010101" pitchFamily="50" charset="-127"/>
-              <a:ea typeface="나눔스퀘어 ExtraBold" panose="020B0600000101010101" pitchFamily="50" charset="-127"/>
-              <a:cs typeface="Arial" panose="020B0604020202020204" pitchFamily="34" charset="0"/>
-            </a:endParaRPr>
+            <a:r>
+              <a:rPr lang="en-US" altLang="ko-KR" sz="2000" dirty="0">
+                <a:solidFill>
+                  <a:schemeClr val="tx1">
+                    <a:lumMod val="85000"/>
+                    <a:lumOff val="15000"/>
+                  </a:schemeClr>
+                </a:solidFill>
+                <a:latin typeface="나눔스퀘어 ExtraBold" panose="020B0600000101010101" pitchFamily="50" charset="-127"/>
+                <a:ea typeface="나눔스퀘어 ExtraBold" panose="020B0600000101010101" pitchFamily="50" charset="-127"/>
+                <a:cs typeface="Arial" panose="020B0604020202020204" pitchFamily="34" charset="0"/>
+              </a:rPr>
+              <a:t>There are a few number of papers.</a:t>
+            </a:r>
+          </a:p>
+          <a:p>
+            <a:pPr marL="432000" indent="-432000">
+              <a:lnSpc>
+                <a:spcPct val="100000"/>
+              </a:lnSpc>
+              <a:buClr>
+                <a:srgbClr val="004F9E"/>
+              </a:buClr>
+              <a:buFont typeface="Wingdings" panose="05000000000000000000" pitchFamily="2" charset="2"/>
+              <a:buChar char="§"/>
+            </a:pPr>
+            <a:r>
+              <a:rPr lang="en-US" altLang="ko-KR" sz="2000" dirty="0">
+                <a:solidFill>
+                  <a:schemeClr val="tx1">
+                    <a:lumMod val="85000"/>
+                    <a:lumOff val="15000"/>
+                  </a:schemeClr>
+                </a:solidFill>
+                <a:latin typeface="나눔스퀘어 ExtraBold" panose="020B0600000101010101" pitchFamily="50" charset="-127"/>
+                <a:ea typeface="나눔스퀘어 ExtraBold" panose="020B0600000101010101" pitchFamily="50" charset="-127"/>
+                <a:cs typeface="Arial" panose="020B0604020202020204" pitchFamily="34" charset="0"/>
+              </a:rPr>
+              <a:t>What they have in common is that they chose GNNs to be able to express data from </a:t>
+            </a:r>
+            <a:r>
+              <a:rPr lang="en-US" altLang="ko-KR" sz="2000" dirty="0" err="1">
+                <a:solidFill>
+                  <a:schemeClr val="tx1">
+                    <a:lumMod val="85000"/>
+                    <a:lumOff val="15000"/>
+                  </a:schemeClr>
+                </a:solidFill>
+                <a:latin typeface="나눔스퀘어 ExtraBold" panose="020B0600000101010101" pitchFamily="50" charset="-127"/>
+                <a:ea typeface="나눔스퀘어 ExtraBold" panose="020B0600000101010101" pitchFamily="50" charset="-127"/>
+                <a:cs typeface="Arial" panose="020B0604020202020204" pitchFamily="34" charset="0"/>
+              </a:rPr>
+              <a:t>RecSys</a:t>
+            </a:r>
+            <a:r>
+              <a:rPr lang="en-US" altLang="ko-KR" sz="2000" dirty="0">
+                <a:solidFill>
+                  <a:schemeClr val="tx1">
+                    <a:lumMod val="85000"/>
+                    <a:lumOff val="15000"/>
+                  </a:schemeClr>
+                </a:solidFill>
+                <a:latin typeface="나눔스퀘어 ExtraBold" panose="020B0600000101010101" pitchFamily="50" charset="-127"/>
+                <a:ea typeface="나눔스퀘어 ExtraBold" panose="020B0600000101010101" pitchFamily="50" charset="-127"/>
+                <a:cs typeface="Arial" panose="020B0604020202020204" pitchFamily="34" charset="0"/>
+              </a:rPr>
+              <a:t> domains based on user-item interactions</a:t>
+            </a:r>
+          </a:p>
+          <a:p>
+            <a:pPr marL="432000" indent="-432000">
+              <a:lnSpc>
+                <a:spcPct val="100000"/>
+              </a:lnSpc>
+              <a:buClr>
+                <a:srgbClr val="004F9E"/>
+              </a:buClr>
+              <a:buFont typeface="Wingdings" panose="05000000000000000000" pitchFamily="2" charset="2"/>
+              <a:buChar char="§"/>
+            </a:pPr>
+            <a:r>
+              <a:rPr lang="en-US" altLang="ko-KR" sz="2000" dirty="0">
+                <a:solidFill>
+                  <a:schemeClr val="tx1">
+                    <a:lumMod val="85000"/>
+                    <a:lumOff val="15000"/>
+                  </a:schemeClr>
+                </a:solidFill>
+                <a:latin typeface="나눔스퀘어 ExtraBold" panose="020B0600000101010101" pitchFamily="50" charset="-127"/>
+                <a:ea typeface="나눔스퀘어 ExtraBold" panose="020B0600000101010101" pitchFamily="50" charset="-127"/>
+                <a:cs typeface="Arial" panose="020B0604020202020204" pitchFamily="34" charset="0"/>
+              </a:rPr>
+              <a:t>Essentially, Continual learning has been chosen to capture and preserve user’s preferences that continue to change over time</a:t>
+            </a:r>
           </a:p>
         </p:txBody>
       </p:sp>
@@ -9064,7 +9147,35 @@
               <a:buFont typeface="Wingdings" panose="05000000000000000000" pitchFamily="2" charset="2"/>
               <a:buChar char="§"/>
             </a:pPr>
-            <a:endParaRPr lang="en-US" altLang="ko-KR" sz="1800" dirty="0">
+            <a:r>
+              <a:rPr lang="en-US" altLang="ko-KR" sz="2000" dirty="0">
+                <a:solidFill>
+                  <a:schemeClr val="tx1">
+                    <a:lumMod val="85000"/>
+                    <a:lumOff val="15000"/>
+                  </a:schemeClr>
+                </a:solidFill>
+                <a:latin typeface="나눔스퀘어 ExtraBold" panose="020B0600000101010101" pitchFamily="50" charset="-127"/>
+                <a:ea typeface="나눔스퀘어 ExtraBold" panose="020B0600000101010101" pitchFamily="50" charset="-127"/>
+                <a:cs typeface="Arial" panose="020B0604020202020204" pitchFamily="34" charset="0"/>
+              </a:rPr>
+              <a:t>Used GNN model = </a:t>
+            </a:r>
+            <a:r>
+              <a:rPr lang="en-US" altLang="ko-KR" sz="2000" dirty="0" err="1">
+                <a:solidFill>
+                  <a:schemeClr val="tx1">
+                    <a:lumMod val="85000"/>
+                    <a:lumOff val="15000"/>
+                  </a:schemeClr>
+                </a:solidFill>
+                <a:latin typeface="나눔스퀘어 ExtraBold" panose="020B0600000101010101" pitchFamily="50" charset="-127"/>
+                <a:ea typeface="나눔스퀘어 ExtraBold" panose="020B0600000101010101" pitchFamily="50" charset="-127"/>
+                <a:cs typeface="Arial" panose="020B0604020202020204" pitchFamily="34" charset="0"/>
+              </a:rPr>
+              <a:t>pinSAGE</a:t>
+            </a:r>
+            <a:endParaRPr lang="en-US" altLang="ko-KR" sz="2000" dirty="0">
               <a:solidFill>
                 <a:schemeClr val="tx1">
                   <a:lumMod val="85000"/>
@@ -9075,6 +9186,32 @@
               <a:ea typeface="나눔스퀘어 ExtraBold" panose="020B0600000101010101" pitchFamily="50" charset="-127"/>
               <a:cs typeface="Arial" panose="020B0604020202020204" pitchFamily="34" charset="0"/>
             </a:endParaRPr>
+          </a:p>
+          <a:p>
+            <a:pPr marL="432000" indent="-432000">
+              <a:lnSpc>
+                <a:spcPct val="100000"/>
+              </a:lnSpc>
+              <a:buClr>
+                <a:srgbClr val="004F9E"/>
+              </a:buClr>
+              <a:buFont typeface="Wingdings" panose="05000000000000000000" pitchFamily="2" charset="2"/>
+              <a:buChar char="§"/>
+            </a:pPr>
+            <a:r>
+              <a:rPr lang="en-US" altLang="ko-KR" sz="2000" dirty="0">
+                <a:solidFill>
+                  <a:schemeClr val="tx1">
+                    <a:lumMod val="85000"/>
+                    <a:lumOff val="15000"/>
+                  </a:schemeClr>
+                </a:solidFill>
+                <a:latin typeface="나눔스퀘어 ExtraBold" panose="020B0600000101010101" pitchFamily="50" charset="-127"/>
+                <a:ea typeface="나눔스퀘어 ExtraBold" panose="020B0600000101010101" pitchFamily="50" charset="-127"/>
+                <a:cs typeface="Arial" panose="020B0604020202020204" pitchFamily="34" charset="0"/>
+              </a:rPr>
+              <a:t>Continual learning approach = regularization, knowledge distillation</a:t>
+            </a:r>
           </a:p>
         </p:txBody>
       </p:sp>
@@ -9226,7 +9363,84 @@
               <a:buFont typeface="Wingdings" panose="05000000000000000000" pitchFamily="2" charset="2"/>
               <a:buChar char="§"/>
             </a:pPr>
-            <a:endParaRPr lang="en-US" altLang="ko-KR" sz="1800" dirty="0">
+            <a:r>
+              <a:rPr lang="en-US" altLang="ko-KR" sz="2000" dirty="0">
+                <a:solidFill>
+                  <a:schemeClr val="tx1">
+                    <a:lumMod val="85000"/>
+                    <a:lumOff val="15000"/>
+                  </a:schemeClr>
+                </a:solidFill>
+                <a:latin typeface="나눔스퀘어 ExtraBold" panose="020B0600000101010101" pitchFamily="50" charset="-127"/>
+                <a:ea typeface="나눔스퀘어 ExtraBold" panose="020B0600000101010101" pitchFamily="50" charset="-127"/>
+                <a:cs typeface="Arial" panose="020B0604020202020204" pitchFamily="34" charset="0"/>
+              </a:rPr>
+              <a:t>Used GNN model = </a:t>
+            </a:r>
+            <a:r>
+              <a:rPr lang="en-US" altLang="ko-KR" sz="2000" dirty="0" err="1">
+                <a:solidFill>
+                  <a:schemeClr val="tx1">
+                    <a:lumMod val="85000"/>
+                    <a:lumOff val="15000"/>
+                  </a:schemeClr>
+                </a:solidFill>
+                <a:latin typeface="나눔스퀘어 ExtraBold" panose="020B0600000101010101" pitchFamily="50" charset="-127"/>
+                <a:ea typeface="나눔스퀘어 ExtraBold" panose="020B0600000101010101" pitchFamily="50" charset="-127"/>
+                <a:cs typeface="Arial" panose="020B0604020202020204" pitchFamily="34" charset="0"/>
+              </a:rPr>
+              <a:t>LightGCN</a:t>
+            </a:r>
+            <a:endParaRPr lang="en-US" altLang="ko-KR" sz="2000" dirty="0">
+              <a:solidFill>
+                <a:schemeClr val="tx1">
+                  <a:lumMod val="85000"/>
+                  <a:lumOff val="15000"/>
+                </a:schemeClr>
+              </a:solidFill>
+              <a:latin typeface="나눔스퀘어 ExtraBold" panose="020B0600000101010101" pitchFamily="50" charset="-127"/>
+              <a:ea typeface="나눔스퀘어 ExtraBold" panose="020B0600000101010101" pitchFamily="50" charset="-127"/>
+              <a:cs typeface="Arial" panose="020B0604020202020204" pitchFamily="34" charset="0"/>
+            </a:endParaRPr>
+          </a:p>
+          <a:p>
+            <a:pPr marL="432000" indent="-432000">
+              <a:lnSpc>
+                <a:spcPct val="100000"/>
+              </a:lnSpc>
+              <a:buClr>
+                <a:srgbClr val="004F9E"/>
+              </a:buClr>
+              <a:buFont typeface="Wingdings" panose="05000000000000000000" pitchFamily="2" charset="2"/>
+              <a:buChar char="§"/>
+            </a:pPr>
+            <a:r>
+              <a:rPr lang="en-US" altLang="ko-KR" sz="2000" dirty="0">
+                <a:solidFill>
+                  <a:schemeClr val="tx1">
+                    <a:lumMod val="85000"/>
+                    <a:lumOff val="15000"/>
+                  </a:schemeClr>
+                </a:solidFill>
+                <a:latin typeface="나눔스퀘어 ExtraBold" panose="020B0600000101010101" pitchFamily="50" charset="-127"/>
+                <a:ea typeface="나눔스퀘어 ExtraBold" panose="020B0600000101010101" pitchFamily="50" charset="-127"/>
+                <a:cs typeface="Arial" panose="020B0604020202020204" pitchFamily="34" charset="0"/>
+              </a:rPr>
+              <a:t>Continual learning approach = regularization, knowledge distillation</a:t>
+            </a:r>
+          </a:p>
+          <a:p>
+            <a:pPr marL="432000" indent="-432000">
+              <a:lnSpc>
+                <a:spcPct val="100000"/>
+              </a:lnSpc>
+              <a:buClr>
+                <a:srgbClr val="004F9E"/>
+              </a:buClr>
+              <a:buFont typeface="Wingdings" panose="05000000000000000000" pitchFamily="2" charset="2"/>
+              <a:buChar char="§"/>
+            </a:pPr>
+            <a:endParaRPr lang="en-US" altLang="ko-KR" sz="2000" dirty="0">
               <a:solidFill>
                 <a:schemeClr val="tx1">
                   <a:lumMod val="85000"/>

</xml_diff>

<commit_message>
paper idea 자료 제작 중
</commit_message>
<xml_diff>
--- a/papers/papersForKCC/논문 관련 조사 및 아이디어.pptx
+++ b/papers/papersForKCC/논문 관련 조사 및 아이디어.pptx
@@ -5,7 +5,7 @@
     <p:sldMasterId id="2147483648" r:id="rId1"/>
   </p:sldMasterIdLst>
   <p:notesMasterIdLst>
-    <p:notesMasterId r:id="rId18"/>
+    <p:notesMasterId r:id="rId21"/>
   </p:notesMasterIdLst>
   <p:sldIdLst>
     <p:sldId id="256" r:id="rId2"/>
@@ -15,15 +15,18 @@
     <p:sldId id="261" r:id="rId6"/>
     <p:sldId id="263" r:id="rId7"/>
     <p:sldId id="264" r:id="rId8"/>
-    <p:sldId id="265" r:id="rId9"/>
-    <p:sldId id="266" r:id="rId10"/>
-    <p:sldId id="267" r:id="rId11"/>
-    <p:sldId id="270" r:id="rId12"/>
-    <p:sldId id="268" r:id="rId13"/>
-    <p:sldId id="269" r:id="rId14"/>
-    <p:sldId id="262" r:id="rId15"/>
-    <p:sldId id="271" r:id="rId16"/>
-    <p:sldId id="272" r:id="rId17"/>
+    <p:sldId id="273" r:id="rId9"/>
+    <p:sldId id="265" r:id="rId10"/>
+    <p:sldId id="274" r:id="rId11"/>
+    <p:sldId id="275" r:id="rId12"/>
+    <p:sldId id="266" r:id="rId13"/>
+    <p:sldId id="267" r:id="rId14"/>
+    <p:sldId id="270" r:id="rId15"/>
+    <p:sldId id="268" r:id="rId16"/>
+    <p:sldId id="269" r:id="rId17"/>
+    <p:sldId id="262" r:id="rId18"/>
+    <p:sldId id="271" r:id="rId19"/>
+    <p:sldId id="272" r:id="rId20"/>
   </p:sldIdLst>
   <p:sldSz cx="12192000" cy="6858000"/>
   <p:notesSz cx="6858000" cy="9144000"/>
@@ -223,7 +226,7 @@
           <a:p>
             <a:fld id="{B4BAEF34-DDA1-41A6-94BB-1D7567B3088F}" type="datetimeFigureOut">
               <a:rPr lang="ko-KR" altLang="en-US" smtClean="0"/>
-              <a:t>2023-03-13</a:t>
+              <a:t>2023-03-14</a:t>
             </a:fld>
             <a:endParaRPr lang="ko-KR" altLang="en-US"/>
           </a:p>
@@ -620,27 +623,60 @@
           <a:p>
             <a:r>
               <a:rPr lang="en-US" altLang="ko-KR" dirty="0"/>
-              <a:t>CF</a:t>
+              <a:t>ER-GNN</a:t>
+            </a:r>
+          </a:p>
+          <a:p>
+            <a:endParaRPr lang="en-US" altLang="ko-KR" dirty="0"/>
+          </a:p>
+          <a:p>
+            <a:r>
+              <a:rPr lang="en-US" altLang="ko-KR" dirty="0"/>
+              <a:t>experience</a:t>
             </a:r>
             <a:r>
               <a:rPr lang="ko-KR" altLang="en-US" dirty="0"/>
-              <a:t>는 유저와 아이템 간의 상호작용을 바탕으로 </a:t>
+              <a:t>로서 이전 </a:t>
             </a:r>
             <a:r>
               <a:rPr lang="en-US" altLang="ko-KR" dirty="0"/>
-              <a:t>collaborative signal</a:t>
+              <a:t>task</a:t>
             </a:r>
             <a:r>
               <a:rPr lang="ko-KR" altLang="en-US" dirty="0"/>
-              <a:t>을 </a:t>
-            </a:r>
-            <a:r>
-              <a:rPr lang="ko-KR" altLang="en-US" dirty="0" err="1"/>
-              <a:t>캡쳐하는</a:t>
+              <a:t>으로 부터 </a:t>
+            </a:r>
+            <a:r>
+              <a:rPr lang="en-US" altLang="ko-KR" dirty="0"/>
+              <a:t>knowledge</a:t>
             </a:r>
             <a:r>
               <a:rPr lang="ko-KR" altLang="en-US" dirty="0"/>
-              <a:t> 것이 핵심이다</a:t>
+              <a:t>를 저장하고</a:t>
+            </a:r>
+            <a:r>
+              <a:rPr lang="en-US" altLang="ko-KR" dirty="0"/>
+              <a:t>, new task</a:t>
+            </a:r>
+            <a:r>
+              <a:rPr lang="ko-KR" altLang="en-US" dirty="0"/>
+              <a:t>를 </a:t>
+            </a:r>
+            <a:r>
+              <a:rPr lang="en-US" altLang="ko-KR" dirty="0"/>
+              <a:t>learning</a:t>
+            </a:r>
+            <a:r>
+              <a:rPr lang="ko-KR" altLang="en-US" dirty="0"/>
+              <a:t>할 때 </a:t>
+            </a:r>
+            <a:r>
+              <a:rPr lang="en-US" altLang="ko-KR" dirty="0"/>
+              <a:t>repla</a:t>
+            </a:r>
+            <a:r>
+              <a:rPr lang="ko-KR" altLang="en-US" dirty="0"/>
+              <a:t>한다</a:t>
             </a:r>
             <a:r>
               <a:rPr lang="en-US" altLang="ko-KR" dirty="0"/>
@@ -648,81 +684,25 @@
             </a:r>
           </a:p>
           <a:p>
-            <a:endParaRPr lang="en-US" altLang="ko-KR" dirty="0"/>
-          </a:p>
-          <a:p>
             <a:r>
               <a:rPr lang="ko-KR" altLang="en-US" dirty="0"/>
-              <a:t>여기서는 </a:t>
-            </a:r>
-            <a:r>
-              <a:rPr lang="ko-KR" altLang="en-US" dirty="0" err="1"/>
-              <a:t>어떤식으로</a:t>
-            </a:r>
-            <a:endParaRPr lang="en-US" altLang="ko-KR" dirty="0"/>
-          </a:p>
-          <a:p>
+              <a:t>이렇게 </a:t>
+            </a:r>
             <a:r>
               <a:rPr lang="en-US" altLang="ko-KR" dirty="0"/>
-              <a:t>Graph construction</a:t>
+              <a:t>experience</a:t>
             </a:r>
             <a:r>
               <a:rPr lang="ko-KR" altLang="en-US" dirty="0"/>
-              <a:t>을 어떻게 하는가</a:t>
+              <a:t>로 사용할 노드를 선택하는 </a:t>
             </a:r>
             <a:r>
               <a:rPr lang="en-US" altLang="ko-KR" dirty="0"/>
-              <a:t>,</a:t>
-            </a:r>
-          </a:p>
-          <a:p>
-            <a:r>
-              <a:rPr lang="en-US" altLang="ko-KR" dirty="0"/>
-              <a:t>Neighbor </a:t>
-            </a:r>
-            <a:r>
-              <a:rPr lang="en-US" altLang="ko-KR" dirty="0" err="1"/>
-              <a:t>agg</a:t>
+              <a:t>3</a:t>
             </a:r>
             <a:r>
               <a:rPr lang="ko-KR" altLang="en-US" dirty="0"/>
-              <a:t>를 하는가</a:t>
-            </a:r>
-            <a:r>
-              <a:rPr lang="en-US" altLang="ko-KR" dirty="0"/>
-              <a:t>,</a:t>
-            </a:r>
-          </a:p>
-          <a:p>
-            <a:r>
-              <a:rPr lang="en-US" altLang="ko-KR" dirty="0"/>
-              <a:t>Information update</a:t>
-            </a:r>
-            <a:r>
-              <a:rPr lang="ko-KR" altLang="en-US" dirty="0"/>
-              <a:t>를 하는가</a:t>
-            </a:r>
-            <a:r>
-              <a:rPr lang="en-US" altLang="ko-KR" dirty="0"/>
-              <a:t>,</a:t>
-            </a:r>
-          </a:p>
-          <a:p>
-            <a:r>
-              <a:rPr lang="en-US" altLang="ko-KR" dirty="0"/>
-              <a:t>Final node rep</a:t>
-            </a:r>
-            <a:r>
-              <a:rPr lang="ko-KR" altLang="en-US" dirty="0"/>
-              <a:t>을 어떻게 </a:t>
-            </a:r>
-            <a:r>
-              <a:rPr lang="ko-KR" altLang="en-US" dirty="0" err="1"/>
-              <a:t>표현하는가가</a:t>
-            </a:r>
-            <a:r>
-              <a:rPr lang="ko-KR" altLang="en-US" dirty="0"/>
-              <a:t> 핵심</a:t>
+              <a:t>가지 방법이 있다</a:t>
             </a:r>
             <a:r>
               <a:rPr lang="en-US" altLang="ko-KR" dirty="0"/>
@@ -731,54 +711,6 @@
           </a:p>
           <a:p>
             <a:endParaRPr lang="en-US" altLang="ko-KR" dirty="0"/>
-          </a:p>
-          <a:p>
-            <a:r>
-              <a:rPr lang="en-US" altLang="ko-KR" dirty="0"/>
-              <a:t>Graph construction: </a:t>
-            </a:r>
-            <a:r>
-              <a:rPr lang="ko-KR" altLang="en-US" dirty="0"/>
-              <a:t>일단 </a:t>
-            </a:r>
-            <a:r>
-              <a:rPr lang="en-US" altLang="ko-KR" dirty="0"/>
-              <a:t>bipartite </a:t>
-            </a:r>
-            <a:r>
-              <a:rPr lang="ko-KR" altLang="en-US" dirty="0"/>
-              <a:t>그래프 </a:t>
-            </a:r>
-            <a:r>
-              <a:rPr lang="ko-KR" altLang="en-US" dirty="0" err="1"/>
-              <a:t>사용하는게</a:t>
-            </a:r>
-            <a:r>
-              <a:rPr lang="ko-KR" altLang="en-US" dirty="0"/>
-              <a:t> 젤 좋은데</a:t>
-            </a:r>
-            <a:r>
-              <a:rPr lang="en-US" altLang="ko-KR" dirty="0"/>
-              <a:t>, </a:t>
-            </a:r>
-          </a:p>
-          <a:p>
-            <a:r>
-              <a:rPr lang="en-US" altLang="ko-KR" dirty="0"/>
-              <a:t>Neighbor </a:t>
-            </a:r>
-            <a:r>
-              <a:rPr lang="en-US" altLang="ko-KR" dirty="0" err="1"/>
-              <a:t>agg</a:t>
-            </a:r>
-            <a:r>
-              <a:rPr lang="en-US" altLang="ko-KR" dirty="0"/>
-              <a:t>: </a:t>
-            </a:r>
-            <a:r>
-              <a:rPr lang="ko-KR" altLang="en-US" dirty="0"/>
-              <a:t>가장 직</a:t>
-            </a:r>
           </a:p>
         </p:txBody>
       </p:sp>
@@ -808,7 +740,7 @@
     </p:spTree>
     <p:extLst>
       <p:ext uri="{BB962C8B-B14F-4D97-AF65-F5344CB8AC3E}">
-        <p14:creationId xmlns:p14="http://schemas.microsoft.com/office/powerpoint/2010/main" val="4254071109"/>
+        <p14:creationId xmlns:p14="http://schemas.microsoft.com/office/powerpoint/2010/main" val="2451463444"/>
       </p:ext>
     </p:extLst>
   </p:cSld>
@@ -862,83 +794,13 @@
           <a:bodyPr/>
           <a:lstStyle/>
           <a:p>
-            <a:pPr marL="228600" indent="-228600">
-              <a:buAutoNum type="arabicPeriod"/>
-            </a:pPr>
             <a:r>
               <a:rPr lang="en-US" altLang="ko-KR" dirty="0"/>
-              <a:t>Causal </a:t>
-            </a:r>
-            <a:r>
-              <a:rPr lang="en-US" altLang="ko-KR" dirty="0" err="1"/>
-              <a:t>incre</a:t>
-            </a:r>
-            <a:r>
-              <a:rPr lang="en-US" altLang="ko-KR" dirty="0"/>
-              <a:t> + </a:t>
+              <a:t>reg</a:t>
             </a:r>
             <a:r>
               <a:rPr lang="ko-KR" altLang="en-US" dirty="0"/>
-              <a:t>다른 </a:t>
-            </a:r>
-            <a:r>
-              <a:rPr lang="en-US" altLang="ko-KR" dirty="0"/>
-              <a:t>GNN </a:t>
-            </a:r>
-            <a:r>
-              <a:rPr lang="ko-KR" altLang="en-US" dirty="0"/>
-              <a:t>모델 </a:t>
-            </a:r>
-            <a:r>
-              <a:rPr lang="en-US" altLang="ko-KR" dirty="0"/>
-              <a:t>like </a:t>
-            </a:r>
-            <a:r>
-              <a:rPr lang="en-US" altLang="ko-KR" dirty="0" err="1"/>
-              <a:t>pinsage</a:t>
-            </a:r>
-            <a:r>
-              <a:rPr lang="en-US" altLang="ko-KR" dirty="0"/>
-              <a:t> </a:t>
-            </a:r>
-          </a:p>
-          <a:p>
-            <a:pPr marL="228600" indent="-228600">
-              <a:buAutoNum type="arabicPeriod"/>
-            </a:pPr>
-            <a:endParaRPr lang="en-US" altLang="ko-KR" dirty="0"/>
-          </a:p>
-          <a:p>
-            <a:pPr marL="0" indent="0">
-              <a:buNone/>
-            </a:pPr>
-            <a:r>
-              <a:rPr lang="en-US" altLang="ko-KR" dirty="0"/>
-              <a:t>Causal </a:t>
-            </a:r>
-            <a:r>
-              <a:rPr lang="ko-KR" altLang="en-US" dirty="0"/>
-              <a:t>은 결과가 너무 사기적이기 때문에 다른 </a:t>
-            </a:r>
-            <a:r>
-              <a:rPr lang="en-US" altLang="ko-KR" dirty="0" err="1"/>
-              <a:t>gnn</a:t>
-            </a:r>
-            <a:r>
-              <a:rPr lang="en-US" altLang="ko-KR" dirty="0"/>
-              <a:t> </a:t>
-            </a:r>
-            <a:r>
-              <a:rPr lang="ko-KR" altLang="en-US" dirty="0"/>
-              <a:t>모델에서도 </a:t>
-            </a:r>
-            <a:r>
-              <a:rPr lang="en-US" altLang="ko-KR" dirty="0"/>
-              <a:t>general</a:t>
-            </a:r>
-            <a:r>
-              <a:rPr lang="ko-KR" altLang="en-US" dirty="0"/>
-              <a:t>하게 동작하는지 검증이 필요</a:t>
+              <a:t> 기반 접근법</a:t>
             </a:r>
             <a:r>
               <a:rPr lang="en-US" altLang="ko-KR" dirty="0"/>
@@ -946,10 +808,94 @@
             </a:r>
           </a:p>
           <a:p>
-            <a:pPr marL="0" indent="0">
-              <a:buNone/>
-            </a:pPr>
-            <a:endParaRPr lang="ko-KR" altLang="en-US" dirty="0"/>
+            <a:endParaRPr lang="en-US" altLang="ko-KR" dirty="0"/>
+          </a:p>
+          <a:p>
+            <a:r>
+              <a:rPr lang="ko-KR" altLang="en-US" dirty="0"/>
+              <a:t>이 방식은 비용 함수에 </a:t>
+            </a:r>
+            <a:r>
+              <a:rPr lang="en-US" altLang="ko-KR" dirty="0"/>
+              <a:t>reg term</a:t>
+            </a:r>
+            <a:r>
+              <a:rPr lang="ko-KR" altLang="en-US" dirty="0"/>
+              <a:t>을 추가하는 방식으로 </a:t>
+            </a:r>
+            <a:r>
+              <a:rPr lang="en-US" altLang="ko-KR" dirty="0"/>
+              <a:t>reg</a:t>
+            </a:r>
+            <a:r>
+              <a:rPr lang="ko-KR" altLang="en-US" dirty="0"/>
+              <a:t>을 한다</a:t>
+            </a:r>
+            <a:r>
+              <a:rPr lang="en-US" altLang="ko-KR" dirty="0"/>
+              <a:t>. </a:t>
+            </a:r>
+            <a:r>
+              <a:rPr lang="ko-KR" altLang="en-US" dirty="0"/>
+              <a:t>기존의 중요한 </a:t>
+            </a:r>
+            <a:r>
+              <a:rPr lang="en-US" altLang="ko-KR" dirty="0"/>
+              <a:t>weight</a:t>
+            </a:r>
+            <a:r>
+              <a:rPr lang="ko-KR" altLang="en-US" dirty="0"/>
+              <a:t>이 날라가지 않도록 하는 접근 방식이다</a:t>
+            </a:r>
+            <a:r>
+              <a:rPr lang="en-US" altLang="ko-KR" dirty="0"/>
+              <a:t>.</a:t>
+            </a:r>
+          </a:p>
+          <a:p>
+            <a:r>
+              <a:rPr lang="ko-KR" altLang="en-US" dirty="0"/>
+              <a:t>내 생각엔 </a:t>
+            </a:r>
+            <a:r>
+              <a:rPr lang="en-US" altLang="ko-KR" dirty="0"/>
+              <a:t>CL </a:t>
+            </a:r>
+            <a:r>
+              <a:rPr lang="ko-KR" altLang="en-US" dirty="0"/>
+              <a:t>방법론 중 가장 연구가 활발하게 되고 있는 분야이고 </a:t>
+            </a:r>
+            <a:r>
+              <a:rPr lang="en-US" altLang="ko-KR" dirty="0" err="1"/>
+              <a:t>graphSAIL</a:t>
+            </a:r>
+            <a:r>
+              <a:rPr lang="ko-KR" altLang="en-US" dirty="0"/>
+              <a:t>의 </a:t>
+            </a:r>
+            <a:r>
+              <a:rPr lang="en-US" altLang="ko-KR" dirty="0"/>
+              <a:t>KD </a:t>
+            </a:r>
+            <a:r>
+              <a:rPr lang="ko-KR" altLang="en-US" dirty="0"/>
+              <a:t>역시 </a:t>
+            </a:r>
+            <a:r>
+              <a:rPr lang="en-US" altLang="ko-KR" dirty="0"/>
+              <a:t>reg </a:t>
+            </a:r>
+            <a:r>
+              <a:rPr lang="ko-KR" altLang="en-US" dirty="0"/>
+              <a:t>기반 접근법의 일종이다</a:t>
+            </a:r>
+            <a:r>
+              <a:rPr lang="en-US" altLang="ko-KR" dirty="0"/>
+              <a:t>.</a:t>
+            </a:r>
+          </a:p>
+          <a:p>
+            <a:endParaRPr lang="en-US" altLang="ko-KR" dirty="0"/>
           </a:p>
         </p:txBody>
       </p:sp>
@@ -979,7 +925,7 @@
     </p:spTree>
     <p:extLst>
       <p:ext uri="{BB962C8B-B14F-4D97-AF65-F5344CB8AC3E}">
-        <p14:creationId xmlns:p14="http://schemas.microsoft.com/office/powerpoint/2010/main" val="2252677923"/>
+        <p14:creationId xmlns:p14="http://schemas.microsoft.com/office/powerpoint/2010/main" val="1642583466"/>
       </p:ext>
     </p:extLst>
   </p:cSld>
@@ -1033,84 +979,106 @@
           <a:bodyPr/>
           <a:lstStyle/>
           <a:p>
+            <a:r>
+              <a:rPr lang="en-US" altLang="ko-KR" dirty="0"/>
+              <a:t>GNN</a:t>
+            </a:r>
+            <a:r>
+              <a:rPr lang="ko-KR" altLang="en-US" dirty="0"/>
+              <a:t>에 추천 도메인을 적용한 사례를 정리했다</a:t>
+            </a:r>
+            <a:r>
+              <a:rPr lang="en-US" altLang="ko-KR" dirty="0"/>
+              <a:t>.</a:t>
+            </a:r>
+          </a:p>
+          <a:p>
+            <a:r>
+              <a:rPr lang="en-US" altLang="ko-KR" dirty="0"/>
+              <a:t>GNN</a:t>
+            </a:r>
+            <a:r>
+              <a:rPr lang="ko-KR" altLang="en-US" dirty="0"/>
+              <a:t>은 </a:t>
+            </a:r>
+            <a:r>
+              <a:rPr lang="en-US" altLang="ko-KR" dirty="0"/>
+              <a:t>rep learning</a:t>
+            </a:r>
+            <a:r>
+              <a:rPr lang="ko-KR" altLang="en-US" dirty="0"/>
+              <a:t>에 강력한 성능을 증명했고</a:t>
+            </a:r>
+            <a:r>
+              <a:rPr lang="en-US" altLang="ko-KR" dirty="0"/>
+              <a:t>.. </a:t>
+            </a:r>
+            <a:r>
+              <a:rPr lang="ko-KR" altLang="en-US" dirty="0"/>
+              <a:t>추천 데이터는 대부분 그래프 구조를 가지고 있다</a:t>
+            </a:r>
+            <a:r>
+              <a:rPr lang="en-US" altLang="ko-KR" dirty="0"/>
+              <a:t>.</a:t>
+            </a:r>
+          </a:p>
+          <a:p>
+            <a:endParaRPr lang="en-US" altLang="ko-KR" dirty="0"/>
+          </a:p>
+          <a:p>
+            <a:r>
+              <a:rPr lang="en-US" altLang="ko-KR" dirty="0"/>
+              <a:t>Information</a:t>
+            </a:r>
+            <a:r>
+              <a:rPr lang="ko-KR" altLang="en-US" dirty="0"/>
+              <a:t>의 종류와 추천 태스크 별로 카테고리를 나눌 수 있다</a:t>
+            </a:r>
+            <a:r>
+              <a:rPr lang="en-US" altLang="ko-KR" dirty="0"/>
+              <a:t>.</a:t>
+            </a:r>
+          </a:p>
+          <a:p>
             <a:pPr marL="228600" indent="-228600">
               <a:buAutoNum type="arabicPeriod"/>
             </a:pPr>
             <a:r>
-              <a:rPr lang="en-US" altLang="ko-KR" dirty="0" err="1"/>
-              <a:t>graphSAIL</a:t>
-            </a:r>
-            <a:r>
-              <a:rPr lang="ko-KR" altLang="en-US" dirty="0"/>
-              <a:t> </a:t>
-            </a:r>
-            <a:r>
               <a:rPr lang="en-US" altLang="ko-KR" dirty="0"/>
-              <a:t>+</a:t>
-            </a:r>
-            <a:r>
-              <a:rPr lang="ko-KR" altLang="en-US" dirty="0"/>
-              <a:t> </a:t>
-            </a:r>
-            <a:r>
-              <a:rPr lang="en-US" altLang="ko-KR" dirty="0"/>
-              <a:t>memory, </a:t>
-            </a:r>
-            <a:r>
-              <a:rPr lang="en-US" altLang="ko-KR" dirty="0" err="1"/>
-              <a:t>iCaRL</a:t>
-            </a:r>
-            <a:endParaRPr lang="en-US" altLang="ko-KR" dirty="0"/>
+              <a:t>CF</a:t>
+            </a:r>
           </a:p>
           <a:p>
             <a:pPr marL="228600" indent="-228600">
               <a:buAutoNum type="arabicPeriod"/>
             </a:pPr>
+            <a:r>
+              <a:rPr lang="ko-KR" altLang="en-US" dirty="0" err="1"/>
+              <a:t>시퀀셜</a:t>
+            </a:r>
+            <a:r>
+              <a:rPr lang="ko-KR" altLang="en-US" dirty="0"/>
+              <a:t> 추천</a:t>
+            </a:r>
             <a:endParaRPr lang="en-US" altLang="ko-KR" dirty="0"/>
           </a:p>
           <a:p>
-            <a:pPr marL="0" indent="0">
-              <a:buNone/>
+            <a:pPr marL="228600" indent="-228600">
+              <a:buAutoNum type="arabicPeriod"/>
             </a:pPr>
             <a:r>
               <a:rPr lang="ko-KR" altLang="en-US" dirty="0"/>
-              <a:t>현재 </a:t>
-            </a:r>
-            <a:r>
-              <a:rPr lang="en-US" altLang="ko-KR" dirty="0" err="1"/>
-              <a:t>graphSAIL</a:t>
-            </a:r>
+              <a:t>소셜</a:t>
+            </a:r>
+            <a:endParaRPr lang="en-US" altLang="ko-KR" dirty="0"/>
+          </a:p>
+          <a:p>
+            <a:pPr marL="228600" indent="-228600">
+              <a:buAutoNum type="arabicPeriod"/>
+            </a:pPr>
             <a:r>
               <a:rPr lang="ko-KR" altLang="en-US" dirty="0"/>
-              <a:t>은 </a:t>
-            </a:r>
-            <a:r>
-              <a:rPr lang="en-US" altLang="ko-KR" dirty="0"/>
-              <a:t>KD</a:t>
-            </a:r>
-            <a:r>
-              <a:rPr lang="ko-KR" altLang="en-US" dirty="0"/>
-              <a:t>기반 </a:t>
-            </a:r>
-            <a:r>
-              <a:rPr lang="en-US" altLang="ko-KR" dirty="0"/>
-              <a:t>reg </a:t>
-            </a:r>
-            <a:r>
-              <a:rPr lang="ko-KR" altLang="en-US" dirty="0"/>
-              <a:t>방식에 집중하고 있음 여기에 </a:t>
-            </a:r>
-            <a:r>
-              <a:rPr lang="en-US" altLang="ko-KR" dirty="0"/>
-              <a:t>+memory </a:t>
-            </a:r>
-            <a:r>
-              <a:rPr lang="ko-KR" altLang="en-US" dirty="0"/>
-              <a:t>방식이 들어간다면</a:t>
-            </a:r>
-            <a:r>
-              <a:rPr lang="en-US" altLang="ko-KR" dirty="0"/>
-              <a:t>?</a:t>
+              <a:t>지식 그래프</a:t>
             </a:r>
           </a:p>
         </p:txBody>
@@ -1141,7 +1109,7 @@
     </p:spTree>
     <p:extLst>
       <p:ext uri="{BB962C8B-B14F-4D97-AF65-F5344CB8AC3E}">
-        <p14:creationId xmlns:p14="http://schemas.microsoft.com/office/powerpoint/2010/main" val="2690387154"/>
+        <p14:creationId xmlns:p14="http://schemas.microsoft.com/office/powerpoint/2010/main" val="2697507245"/>
       </p:ext>
     </p:extLst>
   </p:cSld>
@@ -1195,36 +1163,33 @@
           <a:bodyPr/>
           <a:lstStyle/>
           <a:p>
-            <a:pPr marL="0" marR="0" lvl="0" indent="0" algn="l" defTabSz="914400" rtl="0" eaLnBrk="1" fontAlgn="auto" latinLnBrk="1" hangingPunct="1">
-              <a:lnSpc>
-                <a:spcPct val="100000"/>
-              </a:lnSpc>
-              <a:spcBef>
-                <a:spcPts val="0"/>
-              </a:spcBef>
-              <a:spcAft>
-                <a:spcPts val="0"/>
-              </a:spcAft>
-              <a:buClrTx/>
-              <a:buSzTx/>
-              <a:buFontTx/>
-              <a:buNone/>
-              <a:tabLst/>
-              <a:defRPr/>
-            </a:pPr>
-            <a:r>
-              <a:rPr lang="en-US" altLang="ko-KR" sz="1200" dirty="0">
-                <a:solidFill>
-                  <a:schemeClr val="tx1">
-                    <a:lumMod val="85000"/>
-                    <a:lumOff val="15000"/>
-                  </a:schemeClr>
-                </a:solidFill>
-                <a:latin typeface="나눔스퀘어 ExtraBold" panose="020B0600000101010101" pitchFamily="50" charset="-127"/>
-                <a:ea typeface="나눔스퀘어 ExtraBold" panose="020B0600000101010101" pitchFamily="50" charset="-127"/>
-                <a:cs typeface="Arial" panose="020B0604020202020204" pitchFamily="34" charset="0"/>
-              </a:rPr>
-              <a:t>Lightweight Compositional Embeddings for Incremental Streaming Recommendation</a:t>
+            <a:r>
+              <a:rPr lang="en-US" altLang="ko-KR" dirty="0"/>
+              <a:t>CF</a:t>
+            </a:r>
+            <a:r>
+              <a:rPr lang="ko-KR" altLang="en-US" dirty="0"/>
+              <a:t>는 유저와 아이템 간의 상호작용을 바탕으로 </a:t>
+            </a:r>
+            <a:r>
+              <a:rPr lang="en-US" altLang="ko-KR" dirty="0"/>
+              <a:t>collaborative signal</a:t>
+            </a:r>
+            <a:r>
+              <a:rPr lang="ko-KR" altLang="en-US" dirty="0"/>
+              <a:t>을 </a:t>
+            </a:r>
+            <a:r>
+              <a:rPr lang="ko-KR" altLang="en-US" dirty="0" err="1"/>
+              <a:t>캡쳐하는</a:t>
+            </a:r>
+            <a:r>
+              <a:rPr lang="ko-KR" altLang="en-US" dirty="0"/>
+              <a:t> 것이 핵심이다</a:t>
+            </a:r>
+            <a:r>
+              <a:rPr lang="en-US" altLang="ko-KR" dirty="0"/>
+              <a:t>.</a:t>
             </a:r>
           </a:p>
           <a:p>
@@ -1232,16 +1197,133 @@
           </a:p>
           <a:p>
             <a:r>
+              <a:rPr lang="ko-KR" altLang="en-US" dirty="0"/>
+              <a:t>여기서는 </a:t>
+            </a:r>
+            <a:r>
+              <a:rPr lang="ko-KR" altLang="en-US" dirty="0" err="1"/>
+              <a:t>어떤식으로</a:t>
+            </a:r>
+            <a:endParaRPr lang="en-US" altLang="ko-KR" dirty="0"/>
+          </a:p>
+          <a:p>
+            <a:r>
               <a:rPr lang="en-US" altLang="ko-KR" dirty="0"/>
-              <a:t>GNN model = ??</a:t>
-            </a:r>
-          </a:p>
-          <a:p>
+              <a:t>Graph construction</a:t>
+            </a:r>
+            <a:r>
+              <a:rPr lang="ko-KR" altLang="en-US" dirty="0"/>
+              <a:t>을 어떻게 하는가</a:t>
+            </a:r>
             <a:r>
               <a:rPr lang="en-US" altLang="ko-KR" dirty="0"/>
-              <a:t>CL approach = ??</a:t>
-            </a:r>
-            <a:endParaRPr lang="ko-KR" altLang="en-US" dirty="0"/>
+              <a:t>,</a:t>
+            </a:r>
+          </a:p>
+          <a:p>
+            <a:r>
+              <a:rPr lang="en-US" altLang="ko-KR" dirty="0"/>
+              <a:t>Neighbor </a:t>
+            </a:r>
+            <a:r>
+              <a:rPr lang="en-US" altLang="ko-KR" dirty="0" err="1"/>
+              <a:t>agg</a:t>
+            </a:r>
+            <a:r>
+              <a:rPr lang="ko-KR" altLang="en-US" dirty="0"/>
+              <a:t>를 하는가</a:t>
+            </a:r>
+            <a:r>
+              <a:rPr lang="en-US" altLang="ko-KR" dirty="0"/>
+              <a:t>,</a:t>
+            </a:r>
+          </a:p>
+          <a:p>
+            <a:r>
+              <a:rPr lang="en-US" altLang="ko-KR" dirty="0"/>
+              <a:t>Information update</a:t>
+            </a:r>
+            <a:r>
+              <a:rPr lang="ko-KR" altLang="en-US" dirty="0"/>
+              <a:t>를 하는가</a:t>
+            </a:r>
+            <a:r>
+              <a:rPr lang="en-US" altLang="ko-KR" dirty="0"/>
+              <a:t>,</a:t>
+            </a:r>
+          </a:p>
+          <a:p>
+            <a:r>
+              <a:rPr lang="en-US" altLang="ko-KR" dirty="0"/>
+              <a:t>Final node rep</a:t>
+            </a:r>
+            <a:r>
+              <a:rPr lang="ko-KR" altLang="en-US" dirty="0"/>
+              <a:t>을 어떻게 </a:t>
+            </a:r>
+            <a:r>
+              <a:rPr lang="ko-KR" altLang="en-US" dirty="0" err="1"/>
+              <a:t>표현하는가가</a:t>
+            </a:r>
+            <a:r>
+              <a:rPr lang="ko-KR" altLang="en-US" dirty="0"/>
+              <a:t> 핵심</a:t>
+            </a:r>
+            <a:r>
+              <a:rPr lang="en-US" altLang="ko-KR" dirty="0"/>
+              <a:t>.</a:t>
+            </a:r>
+          </a:p>
+          <a:p>
+            <a:endParaRPr lang="en-US" altLang="ko-KR" dirty="0"/>
+          </a:p>
+          <a:p>
+            <a:r>
+              <a:rPr lang="en-US" altLang="ko-KR" dirty="0"/>
+              <a:t>Graph construction: </a:t>
+            </a:r>
+            <a:r>
+              <a:rPr lang="ko-KR" altLang="en-US" dirty="0"/>
+              <a:t>일단 </a:t>
+            </a:r>
+            <a:r>
+              <a:rPr lang="en-US" altLang="ko-KR" dirty="0"/>
+              <a:t>bipartite </a:t>
+            </a:r>
+            <a:r>
+              <a:rPr lang="ko-KR" altLang="en-US" dirty="0"/>
+              <a:t>그래프 </a:t>
+            </a:r>
+            <a:r>
+              <a:rPr lang="ko-KR" altLang="en-US" dirty="0" err="1"/>
+              <a:t>사용하는게</a:t>
+            </a:r>
+            <a:r>
+              <a:rPr lang="ko-KR" altLang="en-US" dirty="0"/>
+              <a:t> 젤 좋은데</a:t>
+            </a:r>
+            <a:r>
+              <a:rPr lang="en-US" altLang="ko-KR" dirty="0"/>
+              <a:t>, </a:t>
+            </a:r>
+          </a:p>
+          <a:p>
+            <a:r>
+              <a:rPr lang="en-US" altLang="ko-KR" dirty="0"/>
+              <a:t>Neighbor </a:t>
+            </a:r>
+            <a:r>
+              <a:rPr lang="en-US" altLang="ko-KR" dirty="0" err="1"/>
+              <a:t>agg</a:t>
+            </a:r>
+            <a:r>
+              <a:rPr lang="en-US" altLang="ko-KR" dirty="0"/>
+              <a:t>: </a:t>
+            </a:r>
+            <a:r>
+              <a:rPr lang="ko-KR" altLang="en-US" dirty="0"/>
+              <a:t>가장 직</a:t>
+            </a:r>
           </a:p>
         </p:txBody>
       </p:sp>
@@ -1271,7 +1353,7 @@
     </p:spTree>
     <p:extLst>
       <p:ext uri="{BB962C8B-B14F-4D97-AF65-F5344CB8AC3E}">
-        <p14:creationId xmlns:p14="http://schemas.microsoft.com/office/powerpoint/2010/main" val="3315714048"/>
+        <p14:creationId xmlns:p14="http://schemas.microsoft.com/office/powerpoint/2010/main" val="4254071109"/>
       </p:ext>
     </p:extLst>
   </p:cSld>
@@ -1325,30 +1407,83 @@
           <a:bodyPr/>
           <a:lstStyle/>
           <a:p>
-            <a:r>
-              <a:rPr lang="ko-KR" altLang="en-US" dirty="0" err="1"/>
-              <a:t>시퀀셜</a:t>
+            <a:pPr marL="228600" indent="-228600">
+              <a:buAutoNum type="arabicPeriod"/>
+            </a:pPr>
+            <a:r>
+              <a:rPr lang="en-US" altLang="ko-KR" dirty="0"/>
+              <a:t>Causal </a:t>
+            </a:r>
+            <a:r>
+              <a:rPr lang="en-US" altLang="ko-KR" dirty="0" err="1"/>
+              <a:t>incre</a:t>
+            </a:r>
+            <a:r>
+              <a:rPr lang="en-US" altLang="ko-KR" dirty="0"/>
+              <a:t> + </a:t>
             </a:r>
             <a:r>
               <a:rPr lang="ko-KR" altLang="en-US" dirty="0"/>
-              <a:t> 추천</a:t>
+              <a:t>다른 </a:t>
             </a:r>
             <a:r>
               <a:rPr lang="en-US" altLang="ko-KR" dirty="0"/>
-              <a:t>..</a:t>
-            </a:r>
-          </a:p>
-          <a:p>
+              <a:t>GNN </a:t>
+            </a:r>
+            <a:r>
+              <a:rPr lang="ko-KR" altLang="en-US" dirty="0"/>
+              <a:t>모델 </a:t>
+            </a:r>
+            <a:r>
+              <a:rPr lang="en-US" altLang="ko-KR" dirty="0"/>
+              <a:t>like </a:t>
+            </a:r>
+            <a:r>
+              <a:rPr lang="en-US" altLang="ko-KR" dirty="0" err="1"/>
+              <a:t>pinsage</a:t>
+            </a:r>
+            <a:r>
+              <a:rPr lang="en-US" altLang="ko-KR" dirty="0"/>
+              <a:t> </a:t>
+            </a:r>
+          </a:p>
+          <a:p>
+            <a:pPr marL="228600" indent="-228600">
+              <a:buAutoNum type="arabicPeriod"/>
+            </a:pPr>
             <a:endParaRPr lang="en-US" altLang="ko-KR" dirty="0"/>
           </a:p>
           <a:p>
-            <a:r>
-              <a:rPr lang="ko-KR" altLang="en-US" dirty="0" err="1"/>
-              <a:t>시퀀셜</a:t>
+            <a:pPr marL="0" indent="0">
+              <a:buNone/>
+            </a:pPr>
+            <a:r>
+              <a:rPr lang="en-US" altLang="ko-KR" dirty="0"/>
+              <a:t>Causal </a:t>
             </a:r>
             <a:r>
               <a:rPr lang="ko-KR" altLang="en-US" dirty="0"/>
-              <a:t> 추천은 유저의 다음 행동을 예측하는 것이다</a:t>
+              <a:t>은 결과가 너무 사기적이기 때문에 다른 </a:t>
+            </a:r>
+            <a:r>
+              <a:rPr lang="en-US" altLang="ko-KR" dirty="0" err="1"/>
+              <a:t>gnn</a:t>
+            </a:r>
+            <a:r>
+              <a:rPr lang="en-US" altLang="ko-KR" dirty="0"/>
+              <a:t> </a:t>
+            </a:r>
+            <a:r>
+              <a:rPr lang="ko-KR" altLang="en-US" dirty="0"/>
+              <a:t>모델에서도 </a:t>
+            </a:r>
+            <a:r>
+              <a:rPr lang="en-US" altLang="ko-KR" dirty="0"/>
+              <a:t>general</a:t>
+            </a:r>
+            <a:r>
+              <a:rPr lang="ko-KR" altLang="en-US" dirty="0"/>
+              <a:t>하게 동작하는지 검증이 필요</a:t>
             </a:r>
             <a:r>
               <a:rPr lang="en-US" altLang="ko-KR" dirty="0"/>
@@ -1356,211 +1491,9 @@
             </a:r>
           </a:p>
           <a:p>
-            <a:endParaRPr lang="en-US" altLang="ko-KR" dirty="0"/>
-          </a:p>
-          <a:p>
-            <a:r>
-              <a:rPr lang="ko-KR" altLang="en-US" dirty="0"/>
-              <a:t>여기서 </a:t>
-            </a:r>
-            <a:r>
-              <a:rPr lang="ko-KR" altLang="en-US" dirty="0" err="1"/>
-              <a:t>다뤄야할</a:t>
-            </a:r>
-            <a:r>
-              <a:rPr lang="ko-KR" altLang="en-US" dirty="0"/>
-              <a:t> 내용은</a:t>
-            </a:r>
-            <a:r>
-              <a:rPr lang="en-US" altLang="ko-KR" dirty="0"/>
-              <a:t>..</a:t>
-            </a:r>
-          </a:p>
-          <a:p>
-            <a:r>
-              <a:rPr lang="en-US" altLang="ko-KR" dirty="0"/>
-              <a:t>Graph construction: GNN</a:t>
-            </a:r>
-            <a:r>
-              <a:rPr lang="ko-KR" altLang="en-US" dirty="0"/>
-              <a:t>에 </a:t>
-            </a:r>
-            <a:r>
-              <a:rPr lang="ko-KR" altLang="en-US" dirty="0" err="1"/>
-              <a:t>시퀀셜</a:t>
-            </a:r>
-            <a:r>
-              <a:rPr lang="ko-KR" altLang="en-US" dirty="0"/>
-              <a:t> 추천을 적용하기 위해서는</a:t>
-            </a:r>
-            <a:r>
-              <a:rPr lang="en-US" altLang="ko-KR" dirty="0"/>
-              <a:t>, </a:t>
-            </a:r>
-            <a:r>
-              <a:rPr lang="ko-KR" altLang="en-US" dirty="0" err="1"/>
-              <a:t>시퀀셜</a:t>
-            </a:r>
-            <a:r>
-              <a:rPr lang="ko-KR" altLang="en-US" dirty="0"/>
-              <a:t> 데이터가 </a:t>
-            </a:r>
-            <a:r>
-              <a:rPr lang="ko-KR" altLang="en-US" dirty="0" err="1"/>
-              <a:t>시퀀셜</a:t>
-            </a:r>
-            <a:r>
-              <a:rPr lang="ko-KR" altLang="en-US" dirty="0"/>
-              <a:t> 그래프 형태로 바뀌어야 한다</a:t>
-            </a:r>
-            <a:r>
-              <a:rPr lang="en-US" altLang="ko-KR" dirty="0"/>
-              <a:t>. </a:t>
-            </a:r>
-            <a:r>
-              <a:rPr lang="ko-KR" altLang="en-US" dirty="0"/>
-              <a:t>서브 그래프가 충분히 형성 되었는지</a:t>
-            </a:r>
-            <a:r>
-              <a:rPr lang="en-US" altLang="ko-KR" dirty="0"/>
-              <a:t>, .. </a:t>
-            </a:r>
-            <a:r>
-              <a:rPr lang="ko-KR" altLang="en-US" dirty="0"/>
-              <a:t>뭐 그래프를 </a:t>
-            </a:r>
-            <a:r>
-              <a:rPr lang="ko-KR" altLang="en-US" dirty="0" err="1"/>
-              <a:t>어떤식으로</a:t>
-            </a:r>
-            <a:r>
-              <a:rPr lang="ko-KR" altLang="en-US" dirty="0"/>
-              <a:t> </a:t>
-            </a:r>
-            <a:r>
-              <a:rPr lang="ko-KR" altLang="en-US" dirty="0" err="1"/>
-              <a:t>구성할거냐</a:t>
-            </a:r>
-            <a:r>
-              <a:rPr lang="ko-KR" altLang="en-US" dirty="0"/>
-              <a:t> 이런 것들임</a:t>
-            </a:r>
-            <a:r>
-              <a:rPr lang="en-US" altLang="ko-KR" dirty="0"/>
-              <a:t>.</a:t>
-            </a:r>
-          </a:p>
-          <a:p>
-            <a:r>
-              <a:rPr lang="en-US" altLang="ko-KR" dirty="0"/>
-              <a:t>Information propagation: </a:t>
-            </a:r>
-            <a:r>
-              <a:rPr lang="ko-KR" altLang="en-US" dirty="0"/>
-              <a:t>변화 패턴을 </a:t>
-            </a:r>
-            <a:r>
-              <a:rPr lang="ko-KR" altLang="en-US" dirty="0" err="1"/>
-              <a:t>캡쳐하기</a:t>
-            </a:r>
-            <a:r>
-              <a:rPr lang="ko-KR" altLang="en-US" dirty="0"/>
-              <a:t> 위해서는</a:t>
-            </a:r>
-            <a:r>
-              <a:rPr lang="en-US" altLang="ko-KR" dirty="0"/>
-              <a:t>, </a:t>
-            </a:r>
-            <a:r>
-              <a:rPr lang="ko-KR" altLang="en-US" dirty="0"/>
-              <a:t>어떤 </a:t>
-            </a:r>
-            <a:r>
-              <a:rPr lang="en-US" altLang="ko-KR" dirty="0"/>
-              <a:t>propagation </a:t>
-            </a:r>
-            <a:r>
-              <a:rPr lang="ko-KR" altLang="en-US" dirty="0" err="1"/>
-              <a:t>매커니즘이</a:t>
-            </a:r>
-            <a:r>
-              <a:rPr lang="ko-KR" altLang="en-US" dirty="0"/>
-              <a:t> 적절한지</a:t>
-            </a:r>
-            <a:r>
-              <a:rPr lang="en-US" altLang="ko-KR" dirty="0"/>
-              <a:t> </a:t>
-            </a:r>
-            <a:r>
-              <a:rPr lang="ko-KR" altLang="en-US" dirty="0" err="1"/>
-              <a:t>고민해야한다</a:t>
-            </a:r>
-            <a:r>
-              <a:rPr lang="en-US" altLang="ko-KR" dirty="0"/>
-              <a:t>.</a:t>
-            </a:r>
-          </a:p>
-          <a:p>
-            <a:r>
-              <a:rPr lang="en-US" altLang="ko-KR" dirty="0"/>
-              <a:t>Sequential preference: </a:t>
-            </a:r>
-            <a:r>
-              <a:rPr lang="ko-KR" altLang="en-US" dirty="0"/>
-              <a:t>유저의 일시적인 선호도를 알기 위해서는 시퀀스가 통합되어야 한다</a:t>
-            </a:r>
-            <a:r>
-              <a:rPr lang="en-US" altLang="ko-KR" dirty="0"/>
-              <a:t>… </a:t>
-            </a:r>
-            <a:r>
-              <a:rPr lang="ko-KR" altLang="en-US" dirty="0" err="1"/>
-              <a:t>어텐션</a:t>
-            </a:r>
-            <a:r>
-              <a:rPr lang="ko-KR" altLang="en-US" dirty="0"/>
-              <a:t> </a:t>
-            </a:r>
-            <a:r>
-              <a:rPr lang="ko-KR" altLang="en-US" dirty="0" err="1"/>
-              <a:t>풀링을</a:t>
-            </a:r>
-            <a:r>
-              <a:rPr lang="ko-KR" altLang="en-US" dirty="0"/>
-              <a:t> </a:t>
-            </a:r>
-            <a:r>
-              <a:rPr lang="ko-KR" altLang="en-US" dirty="0" err="1"/>
-              <a:t>적용할거냐</a:t>
-            </a:r>
-            <a:r>
-              <a:rPr lang="en-US" altLang="ko-KR" dirty="0"/>
-              <a:t>, RNN </a:t>
-            </a:r>
-            <a:r>
-              <a:rPr lang="ko-KR" altLang="en-US" dirty="0"/>
-              <a:t>구조를 </a:t>
-            </a:r>
-            <a:r>
-              <a:rPr lang="ko-KR" altLang="en-US" dirty="0" err="1"/>
-              <a:t>가져올거냐</a:t>
-            </a:r>
-            <a:r>
-              <a:rPr lang="en-US" altLang="ko-KR" dirty="0"/>
-              <a:t>.. </a:t>
-            </a:r>
-            <a:r>
-              <a:rPr lang="ko-KR" altLang="en-US" dirty="0"/>
-              <a:t>뭐 이런 것들 </a:t>
-            </a:r>
-            <a:r>
-              <a:rPr lang="ko-KR" altLang="en-US" dirty="0" err="1"/>
-              <a:t>고민해야한다</a:t>
-            </a:r>
-            <a:r>
-              <a:rPr lang="en-US" altLang="ko-KR" dirty="0"/>
-              <a:t>.</a:t>
-            </a:r>
+            <a:pPr marL="0" indent="0">
+              <a:buNone/>
+            </a:pPr>
             <a:endParaRPr lang="ko-KR" altLang="en-US" dirty="0"/>
           </a:p>
         </p:txBody>
@@ -1591,7 +1524,7 @@
     </p:spTree>
     <p:extLst>
       <p:ext uri="{BB962C8B-B14F-4D97-AF65-F5344CB8AC3E}">
-        <p14:creationId xmlns:p14="http://schemas.microsoft.com/office/powerpoint/2010/main" val="847534499"/>
+        <p14:creationId xmlns:p14="http://schemas.microsoft.com/office/powerpoint/2010/main" val="2252677923"/>
       </p:ext>
     </p:extLst>
   </p:cSld>
@@ -1645,15 +1578,85 @@
           <a:bodyPr/>
           <a:lstStyle/>
           <a:p>
+            <a:pPr marL="228600" indent="-228600">
+              <a:buAutoNum type="arabicPeriod"/>
+            </a:pPr>
+            <a:r>
+              <a:rPr lang="en-US" altLang="ko-KR" dirty="0" err="1"/>
+              <a:t>graphSAIL</a:t>
+            </a:r>
             <a:r>
               <a:rPr lang="ko-KR" altLang="en-US" dirty="0"/>
-              <a:t>소셜 추천에서는 </a:t>
+              <a:t> </a:t>
             </a:r>
             <a:r>
               <a:rPr lang="en-US" altLang="ko-KR" dirty="0"/>
-              <a:t>..</a:t>
-            </a:r>
-            <a:endParaRPr lang="ko-KR" altLang="en-US" dirty="0"/>
+              <a:t>+</a:t>
+            </a:r>
+            <a:r>
+              <a:rPr lang="ko-KR" altLang="en-US" dirty="0"/>
+              <a:t> </a:t>
+            </a:r>
+            <a:r>
+              <a:rPr lang="en-US" altLang="ko-KR" dirty="0"/>
+              <a:t>memory, </a:t>
+            </a:r>
+            <a:r>
+              <a:rPr lang="en-US" altLang="ko-KR" dirty="0" err="1"/>
+              <a:t>iCaRL</a:t>
+            </a:r>
+            <a:endParaRPr lang="en-US" altLang="ko-KR" dirty="0"/>
+          </a:p>
+          <a:p>
+            <a:pPr marL="228600" indent="-228600">
+              <a:buAutoNum type="arabicPeriod"/>
+            </a:pPr>
+            <a:endParaRPr lang="en-US" altLang="ko-KR" dirty="0"/>
+          </a:p>
+          <a:p>
+            <a:pPr marL="0" indent="0">
+              <a:buNone/>
+            </a:pPr>
+            <a:r>
+              <a:rPr lang="ko-KR" altLang="en-US" dirty="0"/>
+              <a:t>현재 </a:t>
+            </a:r>
+            <a:r>
+              <a:rPr lang="en-US" altLang="ko-KR" dirty="0" err="1"/>
+              <a:t>graphSAIL</a:t>
+            </a:r>
+            <a:r>
+              <a:rPr lang="ko-KR" altLang="en-US" dirty="0"/>
+              <a:t>은 </a:t>
+            </a:r>
+            <a:r>
+              <a:rPr lang="en-US" altLang="ko-KR" dirty="0"/>
+              <a:t>KD</a:t>
+            </a:r>
+            <a:r>
+              <a:rPr lang="ko-KR" altLang="en-US" dirty="0"/>
+              <a:t>기반 </a:t>
+            </a:r>
+            <a:r>
+              <a:rPr lang="en-US" altLang="ko-KR" dirty="0"/>
+              <a:t>reg </a:t>
+            </a:r>
+            <a:r>
+              <a:rPr lang="ko-KR" altLang="en-US" dirty="0"/>
+              <a:t>방식에 집중하고 있음 여기에 </a:t>
+            </a:r>
+            <a:r>
+              <a:rPr lang="en-US" altLang="ko-KR" dirty="0"/>
+              <a:t>+memory </a:t>
+            </a:r>
+            <a:r>
+              <a:rPr lang="ko-KR" altLang="en-US" dirty="0"/>
+              <a:t>방식이 들어간다면</a:t>
+            </a:r>
+            <a:r>
+              <a:rPr lang="en-US" altLang="ko-KR" dirty="0"/>
+              <a:t>?</a:t>
+            </a:r>
           </a:p>
         </p:txBody>
       </p:sp>
@@ -1675,6 +1678,548 @@
             <a:fld id="{E3508E54-26A4-461A-9177-07CC1B35B5F2}" type="slidenum">
               <a:rPr lang="ko-KR" altLang="en-US" smtClean="0"/>
               <a:t>16</a:t>
+            </a:fld>
+            <a:endParaRPr lang="ko-KR" altLang="en-US"/>
+          </a:p>
+        </p:txBody>
+      </p:sp>
+    </p:spTree>
+    <p:extLst>
+      <p:ext uri="{BB962C8B-B14F-4D97-AF65-F5344CB8AC3E}">
+        <p14:creationId xmlns:p14="http://schemas.microsoft.com/office/powerpoint/2010/main" val="2690387154"/>
+      </p:ext>
+    </p:extLst>
+  </p:cSld>
+  <p:clrMapOvr>
+    <a:masterClrMapping/>
+  </p:clrMapOvr>
+</p:notes>
+</file>
+
+<file path=ppt/notesSlides/notesSlide16.xml><?xml version="1.0" encoding="utf-8"?>
+<p:notes xmlns:a="http://schemas.openxmlformats.org/drawingml/2006/main" xmlns:r="http://schemas.openxmlformats.org/officeDocument/2006/relationships" xmlns:p="http://schemas.openxmlformats.org/presentationml/2006/main">
+  <p:cSld>
+    <p:spTree>
+      <p:nvGrpSpPr>
+        <p:cNvPr id="1" name=""/>
+        <p:cNvGrpSpPr/>
+        <p:nvPr/>
+      </p:nvGrpSpPr>
+      <p:grpSpPr>
+        <a:xfrm>
+          <a:off x="0" y="0"/>
+          <a:ext cx="0" cy="0"/>
+          <a:chOff x="0" y="0"/>
+          <a:chExt cx="0" cy="0"/>
+        </a:xfrm>
+      </p:grpSpPr>
+      <p:sp>
+        <p:nvSpPr>
+          <p:cNvPr id="2" name="슬라이드 이미지 개체 틀 1"/>
+          <p:cNvSpPr>
+            <a:spLocks noGrp="1" noRot="1" noChangeAspect="1"/>
+          </p:cNvSpPr>
+          <p:nvPr>
+            <p:ph type="sldImg"/>
+          </p:nvPr>
+        </p:nvSpPr>
+        <p:spPr/>
+      </p:sp>
+      <p:sp>
+        <p:nvSpPr>
+          <p:cNvPr id="3" name="슬라이드 노트 개체 틀 2"/>
+          <p:cNvSpPr>
+            <a:spLocks noGrp="1"/>
+          </p:cNvSpPr>
+          <p:nvPr>
+            <p:ph type="body" idx="1"/>
+          </p:nvPr>
+        </p:nvSpPr>
+        <p:spPr/>
+        <p:txBody>
+          <a:bodyPr/>
+          <a:lstStyle/>
+          <a:p>
+            <a:pPr marL="0" marR="0" lvl="0" indent="0" algn="l" defTabSz="914400" rtl="0" eaLnBrk="1" fontAlgn="auto" latinLnBrk="1" hangingPunct="1">
+              <a:lnSpc>
+                <a:spcPct val="100000"/>
+              </a:lnSpc>
+              <a:spcBef>
+                <a:spcPts val="0"/>
+              </a:spcBef>
+              <a:spcAft>
+                <a:spcPts val="0"/>
+              </a:spcAft>
+              <a:buClrTx/>
+              <a:buSzTx/>
+              <a:buFontTx/>
+              <a:buNone/>
+              <a:tabLst/>
+              <a:defRPr/>
+            </a:pPr>
+            <a:r>
+              <a:rPr lang="en-US" altLang="ko-KR" sz="1200" dirty="0">
+                <a:solidFill>
+                  <a:schemeClr val="tx1">
+                    <a:lumMod val="85000"/>
+                    <a:lumOff val="15000"/>
+                  </a:schemeClr>
+                </a:solidFill>
+                <a:latin typeface="나눔스퀘어 ExtraBold" panose="020B0600000101010101" pitchFamily="50" charset="-127"/>
+                <a:ea typeface="나눔스퀘어 ExtraBold" panose="020B0600000101010101" pitchFamily="50" charset="-127"/>
+                <a:cs typeface="Arial" panose="020B0604020202020204" pitchFamily="34" charset="0"/>
+              </a:rPr>
+              <a:t>Lightweight Compositional Embeddings for Incremental Streaming Recommendation</a:t>
+            </a:r>
+          </a:p>
+          <a:p>
+            <a:endParaRPr lang="en-US" altLang="ko-KR" dirty="0"/>
+          </a:p>
+          <a:p>
+            <a:r>
+              <a:rPr lang="en-US" altLang="ko-KR" dirty="0"/>
+              <a:t>GNN model = ??</a:t>
+            </a:r>
+          </a:p>
+          <a:p>
+            <a:r>
+              <a:rPr lang="en-US" altLang="ko-KR" dirty="0"/>
+              <a:t>CL approach = ??</a:t>
+            </a:r>
+            <a:endParaRPr lang="ko-KR" altLang="en-US" dirty="0"/>
+          </a:p>
+        </p:txBody>
+      </p:sp>
+      <p:sp>
+        <p:nvSpPr>
+          <p:cNvPr id="4" name="슬라이드 번호 개체 틀 3"/>
+          <p:cNvSpPr>
+            <a:spLocks noGrp="1"/>
+          </p:cNvSpPr>
+          <p:nvPr>
+            <p:ph type="sldNum" sz="quarter" idx="5"/>
+          </p:nvPr>
+        </p:nvSpPr>
+        <p:spPr/>
+        <p:txBody>
+          <a:bodyPr/>
+          <a:lstStyle/>
+          <a:p>
+            <a:fld id="{E3508E54-26A4-461A-9177-07CC1B35B5F2}" type="slidenum">
+              <a:rPr lang="ko-KR" altLang="en-US" smtClean="0"/>
+              <a:t>17</a:t>
+            </a:fld>
+            <a:endParaRPr lang="ko-KR" altLang="en-US"/>
+          </a:p>
+        </p:txBody>
+      </p:sp>
+    </p:spTree>
+    <p:extLst>
+      <p:ext uri="{BB962C8B-B14F-4D97-AF65-F5344CB8AC3E}">
+        <p14:creationId xmlns:p14="http://schemas.microsoft.com/office/powerpoint/2010/main" val="3315714048"/>
+      </p:ext>
+    </p:extLst>
+  </p:cSld>
+  <p:clrMapOvr>
+    <a:masterClrMapping/>
+  </p:clrMapOvr>
+</p:notes>
+</file>
+
+<file path=ppt/notesSlides/notesSlide17.xml><?xml version="1.0" encoding="utf-8"?>
+<p:notes xmlns:a="http://schemas.openxmlformats.org/drawingml/2006/main" xmlns:r="http://schemas.openxmlformats.org/officeDocument/2006/relationships" xmlns:p="http://schemas.openxmlformats.org/presentationml/2006/main">
+  <p:cSld>
+    <p:spTree>
+      <p:nvGrpSpPr>
+        <p:cNvPr id="1" name=""/>
+        <p:cNvGrpSpPr/>
+        <p:nvPr/>
+      </p:nvGrpSpPr>
+      <p:grpSpPr>
+        <a:xfrm>
+          <a:off x="0" y="0"/>
+          <a:ext cx="0" cy="0"/>
+          <a:chOff x="0" y="0"/>
+          <a:chExt cx="0" cy="0"/>
+        </a:xfrm>
+      </p:grpSpPr>
+      <p:sp>
+        <p:nvSpPr>
+          <p:cNvPr id="2" name="슬라이드 이미지 개체 틀 1"/>
+          <p:cNvSpPr>
+            <a:spLocks noGrp="1" noRot="1" noChangeAspect="1"/>
+          </p:cNvSpPr>
+          <p:nvPr>
+            <p:ph type="sldImg"/>
+          </p:nvPr>
+        </p:nvSpPr>
+        <p:spPr/>
+      </p:sp>
+      <p:sp>
+        <p:nvSpPr>
+          <p:cNvPr id="3" name="슬라이드 노트 개체 틀 2"/>
+          <p:cNvSpPr>
+            <a:spLocks noGrp="1"/>
+          </p:cNvSpPr>
+          <p:nvPr>
+            <p:ph type="body" idx="1"/>
+          </p:nvPr>
+        </p:nvSpPr>
+        <p:spPr/>
+        <p:txBody>
+          <a:bodyPr/>
+          <a:lstStyle/>
+          <a:p>
+            <a:r>
+              <a:rPr lang="ko-KR" altLang="en-US" dirty="0" err="1"/>
+              <a:t>시퀀셜</a:t>
+            </a:r>
+            <a:r>
+              <a:rPr lang="ko-KR" altLang="en-US" dirty="0"/>
+              <a:t> 추천</a:t>
+            </a:r>
+            <a:r>
+              <a:rPr lang="en-US" altLang="ko-KR" dirty="0"/>
+              <a:t>..</a:t>
+            </a:r>
+          </a:p>
+          <a:p>
+            <a:endParaRPr lang="en-US" altLang="ko-KR" dirty="0"/>
+          </a:p>
+          <a:p>
+            <a:r>
+              <a:rPr lang="ko-KR" altLang="en-US" dirty="0" err="1"/>
+              <a:t>시퀀셜</a:t>
+            </a:r>
+            <a:r>
+              <a:rPr lang="ko-KR" altLang="en-US" dirty="0"/>
+              <a:t> 추천은 유저의 다음 행동을 예측하는 것이다</a:t>
+            </a:r>
+            <a:r>
+              <a:rPr lang="en-US" altLang="ko-KR" dirty="0"/>
+              <a:t>.</a:t>
+            </a:r>
+          </a:p>
+          <a:p>
+            <a:endParaRPr lang="en-US" altLang="ko-KR" dirty="0"/>
+          </a:p>
+          <a:p>
+            <a:r>
+              <a:rPr lang="ko-KR" altLang="en-US" dirty="0"/>
+              <a:t>여기서 </a:t>
+            </a:r>
+            <a:r>
+              <a:rPr lang="ko-KR" altLang="en-US" dirty="0" err="1"/>
+              <a:t>다뤄야할</a:t>
+            </a:r>
+            <a:r>
+              <a:rPr lang="ko-KR" altLang="en-US" dirty="0"/>
+              <a:t> 내용은</a:t>
+            </a:r>
+            <a:r>
+              <a:rPr lang="en-US" altLang="ko-KR" dirty="0"/>
+              <a:t>..</a:t>
+            </a:r>
+          </a:p>
+          <a:p>
+            <a:r>
+              <a:rPr lang="en-US" altLang="ko-KR" dirty="0"/>
+              <a:t>Graph construction: GNN</a:t>
+            </a:r>
+            <a:r>
+              <a:rPr lang="ko-KR" altLang="en-US" dirty="0"/>
+              <a:t>에 </a:t>
+            </a:r>
+            <a:r>
+              <a:rPr lang="ko-KR" altLang="en-US" dirty="0" err="1"/>
+              <a:t>시퀀셜</a:t>
+            </a:r>
+            <a:r>
+              <a:rPr lang="ko-KR" altLang="en-US" dirty="0"/>
+              <a:t> 추천을 적용하기 위해서는</a:t>
+            </a:r>
+            <a:r>
+              <a:rPr lang="en-US" altLang="ko-KR" dirty="0"/>
+              <a:t>, </a:t>
+            </a:r>
+            <a:r>
+              <a:rPr lang="ko-KR" altLang="en-US" dirty="0" err="1"/>
+              <a:t>시퀀셜</a:t>
+            </a:r>
+            <a:r>
+              <a:rPr lang="ko-KR" altLang="en-US" dirty="0"/>
+              <a:t> 데이터가 </a:t>
+            </a:r>
+            <a:r>
+              <a:rPr lang="ko-KR" altLang="en-US" dirty="0" err="1"/>
+              <a:t>시퀀셜</a:t>
+            </a:r>
+            <a:r>
+              <a:rPr lang="ko-KR" altLang="en-US" dirty="0"/>
+              <a:t> 그래프 형태로 바뀌어야 한다</a:t>
+            </a:r>
+            <a:r>
+              <a:rPr lang="en-US" altLang="ko-KR" dirty="0"/>
+              <a:t>. </a:t>
+            </a:r>
+            <a:r>
+              <a:rPr lang="ko-KR" altLang="en-US" dirty="0"/>
+              <a:t>서브 그래프가 충분히 형성 되었는지</a:t>
+            </a:r>
+            <a:r>
+              <a:rPr lang="en-US" altLang="ko-KR" dirty="0"/>
+              <a:t>, .. </a:t>
+            </a:r>
+            <a:r>
+              <a:rPr lang="ko-KR" altLang="en-US" dirty="0"/>
+              <a:t>뭐 그래프를 </a:t>
+            </a:r>
+            <a:r>
+              <a:rPr lang="ko-KR" altLang="en-US" dirty="0" err="1"/>
+              <a:t>어떤식으로</a:t>
+            </a:r>
+            <a:r>
+              <a:rPr lang="ko-KR" altLang="en-US" dirty="0"/>
+              <a:t> </a:t>
+            </a:r>
+            <a:r>
+              <a:rPr lang="ko-KR" altLang="en-US" dirty="0" err="1"/>
+              <a:t>구성할거냐</a:t>
+            </a:r>
+            <a:r>
+              <a:rPr lang="ko-KR" altLang="en-US" dirty="0"/>
+              <a:t> 이런 것들임</a:t>
+            </a:r>
+            <a:r>
+              <a:rPr lang="en-US" altLang="ko-KR" dirty="0"/>
+              <a:t>.</a:t>
+            </a:r>
+          </a:p>
+          <a:p>
+            <a:r>
+              <a:rPr lang="en-US" altLang="ko-KR" dirty="0"/>
+              <a:t>Information propagation: </a:t>
+            </a:r>
+            <a:r>
+              <a:rPr lang="ko-KR" altLang="en-US" dirty="0"/>
+              <a:t>변화 패턴을 </a:t>
+            </a:r>
+            <a:r>
+              <a:rPr lang="ko-KR" altLang="en-US" dirty="0" err="1"/>
+              <a:t>캡쳐하기</a:t>
+            </a:r>
+            <a:r>
+              <a:rPr lang="ko-KR" altLang="en-US" dirty="0"/>
+              <a:t> 위해서는</a:t>
+            </a:r>
+            <a:r>
+              <a:rPr lang="en-US" altLang="ko-KR" dirty="0"/>
+              <a:t>, </a:t>
+            </a:r>
+            <a:r>
+              <a:rPr lang="ko-KR" altLang="en-US" dirty="0"/>
+              <a:t>어떤 </a:t>
+            </a:r>
+            <a:r>
+              <a:rPr lang="en-US" altLang="ko-KR" dirty="0"/>
+              <a:t>propagation </a:t>
+            </a:r>
+            <a:r>
+              <a:rPr lang="ko-KR" altLang="en-US" dirty="0" err="1"/>
+              <a:t>매커니즘이</a:t>
+            </a:r>
+            <a:r>
+              <a:rPr lang="ko-KR" altLang="en-US" dirty="0"/>
+              <a:t> 적절한지</a:t>
+            </a:r>
+            <a:r>
+              <a:rPr lang="en-US" altLang="ko-KR" dirty="0"/>
+              <a:t> </a:t>
+            </a:r>
+            <a:r>
+              <a:rPr lang="ko-KR" altLang="en-US" dirty="0" err="1"/>
+              <a:t>고민해야한다</a:t>
+            </a:r>
+            <a:r>
+              <a:rPr lang="en-US" altLang="ko-KR" dirty="0"/>
+              <a:t>.</a:t>
+            </a:r>
+          </a:p>
+          <a:p>
+            <a:r>
+              <a:rPr lang="en-US" altLang="ko-KR" dirty="0"/>
+              <a:t>Sequential preference: </a:t>
+            </a:r>
+            <a:r>
+              <a:rPr lang="ko-KR" altLang="en-US" dirty="0"/>
+              <a:t>유저의 일시적인 선호도를 알기 위해서는 시퀀스가 통합되어야 한다</a:t>
+            </a:r>
+            <a:r>
+              <a:rPr lang="en-US" altLang="ko-KR" dirty="0"/>
+              <a:t>… </a:t>
+            </a:r>
+            <a:r>
+              <a:rPr lang="ko-KR" altLang="en-US" dirty="0" err="1"/>
+              <a:t>어텐션</a:t>
+            </a:r>
+            <a:r>
+              <a:rPr lang="ko-KR" altLang="en-US" dirty="0"/>
+              <a:t> </a:t>
+            </a:r>
+            <a:r>
+              <a:rPr lang="ko-KR" altLang="en-US" dirty="0" err="1"/>
+              <a:t>풀링을</a:t>
+            </a:r>
+            <a:r>
+              <a:rPr lang="ko-KR" altLang="en-US" dirty="0"/>
+              <a:t> </a:t>
+            </a:r>
+            <a:r>
+              <a:rPr lang="ko-KR" altLang="en-US" dirty="0" err="1"/>
+              <a:t>적용할거냐</a:t>
+            </a:r>
+            <a:r>
+              <a:rPr lang="en-US" altLang="ko-KR" dirty="0"/>
+              <a:t>, RNN </a:t>
+            </a:r>
+            <a:r>
+              <a:rPr lang="ko-KR" altLang="en-US" dirty="0"/>
+              <a:t>구조를 </a:t>
+            </a:r>
+            <a:r>
+              <a:rPr lang="ko-KR" altLang="en-US" dirty="0" err="1"/>
+              <a:t>가져올거냐</a:t>
+            </a:r>
+            <a:r>
+              <a:rPr lang="en-US" altLang="ko-KR" dirty="0"/>
+              <a:t>.. </a:t>
+            </a:r>
+            <a:r>
+              <a:rPr lang="ko-KR" altLang="en-US" dirty="0"/>
+              <a:t>뭐 이런 것들 </a:t>
+            </a:r>
+            <a:r>
+              <a:rPr lang="ko-KR" altLang="en-US" dirty="0" err="1"/>
+              <a:t>고민해야한다</a:t>
+            </a:r>
+            <a:r>
+              <a:rPr lang="en-US" altLang="ko-KR" dirty="0"/>
+              <a:t>.</a:t>
+            </a:r>
+            <a:endParaRPr lang="ko-KR" altLang="en-US" dirty="0"/>
+          </a:p>
+        </p:txBody>
+      </p:sp>
+      <p:sp>
+        <p:nvSpPr>
+          <p:cNvPr id="4" name="슬라이드 번호 개체 틀 3"/>
+          <p:cNvSpPr>
+            <a:spLocks noGrp="1"/>
+          </p:cNvSpPr>
+          <p:nvPr>
+            <p:ph type="sldNum" sz="quarter" idx="5"/>
+          </p:nvPr>
+        </p:nvSpPr>
+        <p:spPr/>
+        <p:txBody>
+          <a:bodyPr/>
+          <a:lstStyle/>
+          <a:p>
+            <a:fld id="{E3508E54-26A4-461A-9177-07CC1B35B5F2}" type="slidenum">
+              <a:rPr lang="ko-KR" altLang="en-US" smtClean="0"/>
+              <a:t>18</a:t>
+            </a:fld>
+            <a:endParaRPr lang="ko-KR" altLang="en-US"/>
+          </a:p>
+        </p:txBody>
+      </p:sp>
+    </p:spTree>
+    <p:extLst>
+      <p:ext uri="{BB962C8B-B14F-4D97-AF65-F5344CB8AC3E}">
+        <p14:creationId xmlns:p14="http://schemas.microsoft.com/office/powerpoint/2010/main" val="847534499"/>
+      </p:ext>
+    </p:extLst>
+  </p:cSld>
+  <p:clrMapOvr>
+    <a:masterClrMapping/>
+  </p:clrMapOvr>
+</p:notes>
+</file>
+
+<file path=ppt/notesSlides/notesSlide18.xml><?xml version="1.0" encoding="utf-8"?>
+<p:notes xmlns:a="http://schemas.openxmlformats.org/drawingml/2006/main" xmlns:r="http://schemas.openxmlformats.org/officeDocument/2006/relationships" xmlns:p="http://schemas.openxmlformats.org/presentationml/2006/main">
+  <p:cSld>
+    <p:spTree>
+      <p:nvGrpSpPr>
+        <p:cNvPr id="1" name=""/>
+        <p:cNvGrpSpPr/>
+        <p:nvPr/>
+      </p:nvGrpSpPr>
+      <p:grpSpPr>
+        <a:xfrm>
+          <a:off x="0" y="0"/>
+          <a:ext cx="0" cy="0"/>
+          <a:chOff x="0" y="0"/>
+          <a:chExt cx="0" cy="0"/>
+        </a:xfrm>
+      </p:grpSpPr>
+      <p:sp>
+        <p:nvSpPr>
+          <p:cNvPr id="2" name="슬라이드 이미지 개체 틀 1"/>
+          <p:cNvSpPr>
+            <a:spLocks noGrp="1" noRot="1" noChangeAspect="1"/>
+          </p:cNvSpPr>
+          <p:nvPr>
+            <p:ph type="sldImg"/>
+          </p:nvPr>
+        </p:nvSpPr>
+        <p:spPr/>
+      </p:sp>
+      <p:sp>
+        <p:nvSpPr>
+          <p:cNvPr id="3" name="슬라이드 노트 개체 틀 2"/>
+          <p:cNvSpPr>
+            <a:spLocks noGrp="1"/>
+          </p:cNvSpPr>
+          <p:nvPr>
+            <p:ph type="body" idx="1"/>
+          </p:nvPr>
+        </p:nvSpPr>
+        <p:spPr/>
+        <p:txBody>
+          <a:bodyPr/>
+          <a:lstStyle/>
+          <a:p>
+            <a:r>
+              <a:rPr lang="ko-KR" altLang="en-US" dirty="0"/>
+              <a:t>소셜 추천에서는 </a:t>
+            </a:r>
+            <a:r>
+              <a:rPr lang="en-US" altLang="ko-KR" dirty="0"/>
+              <a:t>..</a:t>
+            </a:r>
+            <a:endParaRPr lang="ko-KR" altLang="en-US" dirty="0"/>
+          </a:p>
+        </p:txBody>
+      </p:sp>
+      <p:sp>
+        <p:nvSpPr>
+          <p:cNvPr id="4" name="슬라이드 번호 개체 틀 3"/>
+          <p:cNvSpPr>
+            <a:spLocks noGrp="1"/>
+          </p:cNvSpPr>
+          <p:nvPr>
+            <p:ph type="sldNum" sz="quarter" idx="5"/>
+          </p:nvPr>
+        </p:nvSpPr>
+        <p:spPr/>
+        <p:txBody>
+          <a:bodyPr/>
+          <a:lstStyle/>
+          <a:p>
+            <a:fld id="{E3508E54-26A4-461A-9177-07CC1B35B5F2}" type="slidenum">
+              <a:rPr lang="ko-KR" altLang="en-US" smtClean="0"/>
+              <a:t>19</a:t>
             </a:fld>
             <a:endParaRPr lang="ko-KR" altLang="en-US"/>
           </a:p>
@@ -2391,35 +2936,7 @@
           <a:bodyPr/>
           <a:lstStyle/>
           <a:p>
-            <a:r>
-              <a:rPr lang="ko-KR" altLang="en-US" dirty="0"/>
-              <a:t>리허설 기반 접근법</a:t>
-            </a:r>
-            <a:r>
-              <a:rPr lang="en-US" altLang="ko-KR" dirty="0"/>
-              <a:t>.</a:t>
-            </a:r>
-          </a:p>
-          <a:p>
-            <a:endParaRPr lang="en-US" altLang="ko-KR" dirty="0"/>
-          </a:p>
-          <a:p>
-            <a:r>
-              <a:rPr lang="ko-KR" altLang="en-US" dirty="0"/>
-              <a:t>리허설 방식은 이전 태스크의 중요한 정보를 가지고 있는 샘플을 메모리에 저장하고 있다가 </a:t>
-            </a:r>
-            <a:r>
-              <a:rPr lang="ko-KR" altLang="en-US" dirty="0" err="1"/>
-              <a:t>재훈련할</a:t>
-            </a:r>
-            <a:r>
-              <a:rPr lang="ko-KR" altLang="en-US" dirty="0"/>
-              <a:t> 때 사용하는 방식이다</a:t>
-            </a:r>
-            <a:r>
-              <a:rPr lang="en-US" altLang="ko-KR" dirty="0"/>
-              <a:t>.</a:t>
-            </a:r>
+            <a:endParaRPr lang="ko-KR" altLang="en-US" dirty="0"/>
           </a:p>
         </p:txBody>
       </p:sp>
@@ -2449,7 +2966,7 @@
     </p:spTree>
     <p:extLst>
       <p:ext uri="{BB962C8B-B14F-4D97-AF65-F5344CB8AC3E}">
-        <p14:creationId xmlns:p14="http://schemas.microsoft.com/office/powerpoint/2010/main" val="143300434"/>
+        <p14:creationId xmlns:p14="http://schemas.microsoft.com/office/powerpoint/2010/main" val="2169219223"/>
       </p:ext>
     </p:extLst>
   </p:cSld>
@@ -2504,12 +3021,8 @@
           <a:lstStyle/>
           <a:p>
             <a:r>
-              <a:rPr lang="en-US" altLang="ko-KR" dirty="0"/>
-              <a:t>reg</a:t>
-            </a:r>
-            <a:r>
               <a:rPr lang="ko-KR" altLang="en-US" dirty="0"/>
-              <a:t> 기반 접근법</a:t>
+              <a:t>리허설 기반 접근법</a:t>
             </a:r>
             <a:r>
               <a:rPr lang="en-US" altLang="ko-KR" dirty="0"/>
@@ -2522,89 +3035,20 @@
           <a:p>
             <a:r>
               <a:rPr lang="ko-KR" altLang="en-US" dirty="0"/>
-              <a:t>이 방식은 비용 함수에 </a:t>
-            </a:r>
-            <a:r>
-              <a:rPr lang="en-US" altLang="ko-KR" dirty="0"/>
-              <a:t>reg term</a:t>
+              <a:t>리허설 방식은 이전 태스크의 중요한 정보를 가지고 있는 샘플을 메모리에 저장하고 있다가 </a:t>
+            </a:r>
+            <a:r>
+              <a:rPr lang="ko-KR" altLang="en-US" dirty="0" err="1"/>
+              <a:t>재훈련할</a:t>
             </a:r>
             <a:r>
               <a:rPr lang="ko-KR" altLang="en-US" dirty="0"/>
-              <a:t>을 추가하는 방식으로 </a:t>
-            </a:r>
-            <a:r>
-              <a:rPr lang="en-US" altLang="ko-KR" dirty="0"/>
-              <a:t>reg</a:t>
-            </a:r>
-            <a:r>
-              <a:rPr lang="ko-KR" altLang="en-US" dirty="0"/>
-              <a:t>을 한다</a:t>
-            </a:r>
-            <a:r>
-              <a:rPr lang="en-US" altLang="ko-KR" dirty="0"/>
-              <a:t>. </a:t>
-            </a:r>
-            <a:r>
-              <a:rPr lang="ko-KR" altLang="en-US" dirty="0"/>
-              <a:t>기존의 중요한 </a:t>
-            </a:r>
-            <a:r>
-              <a:rPr lang="en-US" altLang="ko-KR" dirty="0"/>
-              <a:t>weight</a:t>
-            </a:r>
-            <a:r>
-              <a:rPr lang="ko-KR" altLang="en-US" dirty="0"/>
-              <a:t>이 날라가지 않도록 하는 접근 방식이다</a:t>
+              <a:t> 때 사용하는 방식이다</a:t>
             </a:r>
             <a:r>
               <a:rPr lang="en-US" altLang="ko-KR" dirty="0"/>
               <a:t>.</a:t>
             </a:r>
-          </a:p>
-          <a:p>
-            <a:r>
-              <a:rPr lang="ko-KR" altLang="en-US" dirty="0"/>
-              <a:t>내 생각엔 </a:t>
-            </a:r>
-            <a:r>
-              <a:rPr lang="en-US" altLang="ko-KR" dirty="0"/>
-              <a:t>CL </a:t>
-            </a:r>
-            <a:r>
-              <a:rPr lang="ko-KR" altLang="en-US" dirty="0"/>
-              <a:t>방법론 중 가장 연구가 활발하게 되고 있는 분야이고 </a:t>
-            </a:r>
-            <a:r>
-              <a:rPr lang="en-US" altLang="ko-KR" dirty="0" err="1"/>
-              <a:t>graphSAIL</a:t>
-            </a:r>
-            <a:r>
-              <a:rPr lang="ko-KR" altLang="en-US" dirty="0"/>
-              <a:t>의 </a:t>
-            </a:r>
-            <a:r>
-              <a:rPr lang="en-US" altLang="ko-KR" dirty="0"/>
-              <a:t>KD </a:t>
-            </a:r>
-            <a:r>
-              <a:rPr lang="ko-KR" altLang="en-US" dirty="0"/>
-              <a:t>역시 </a:t>
-            </a:r>
-            <a:r>
-              <a:rPr lang="en-US" altLang="ko-KR" dirty="0"/>
-              <a:t>reg </a:t>
-            </a:r>
-            <a:r>
-              <a:rPr lang="ko-KR" altLang="en-US" dirty="0"/>
-              <a:t>기반 접근법의 일종이다</a:t>
-            </a:r>
-            <a:r>
-              <a:rPr lang="en-US" altLang="ko-KR" dirty="0"/>
-              <a:t>.</a:t>
-            </a:r>
-          </a:p>
-          <a:p>
-            <a:endParaRPr lang="en-US" altLang="ko-KR" dirty="0"/>
           </a:p>
         </p:txBody>
       </p:sp>
@@ -2634,7 +3078,7 @@
     </p:spTree>
     <p:extLst>
       <p:ext uri="{BB962C8B-B14F-4D97-AF65-F5344CB8AC3E}">
-        <p14:creationId xmlns:p14="http://schemas.microsoft.com/office/powerpoint/2010/main" val="1642583466"/>
+        <p14:creationId xmlns:p14="http://schemas.microsoft.com/office/powerpoint/2010/main" val="143300434"/>
       </p:ext>
     </p:extLst>
   </p:cSld>
@@ -2690,11 +3134,60 @@
           <a:p>
             <a:r>
               <a:rPr lang="en-US" altLang="ko-KR" dirty="0"/>
-              <a:t>GNN</a:t>
+              <a:t>ER-GNN</a:t>
+            </a:r>
+          </a:p>
+          <a:p>
+            <a:endParaRPr lang="en-US" altLang="ko-KR" dirty="0"/>
+          </a:p>
+          <a:p>
+            <a:r>
+              <a:rPr lang="en-US" altLang="ko-KR" dirty="0"/>
+              <a:t>experience</a:t>
             </a:r>
             <a:r>
               <a:rPr lang="ko-KR" altLang="en-US" dirty="0"/>
-              <a:t>에 추천 도메인을 적용한 사례를 정리했다</a:t>
+              <a:t>로서 이전 </a:t>
+            </a:r>
+            <a:r>
+              <a:rPr lang="en-US" altLang="ko-KR" dirty="0"/>
+              <a:t>task</a:t>
+            </a:r>
+            <a:r>
+              <a:rPr lang="ko-KR" altLang="en-US" dirty="0"/>
+              <a:t>으로 부터 </a:t>
+            </a:r>
+            <a:r>
+              <a:rPr lang="en-US" altLang="ko-KR" dirty="0"/>
+              <a:t>knowledge</a:t>
+            </a:r>
+            <a:r>
+              <a:rPr lang="ko-KR" altLang="en-US" dirty="0"/>
+              <a:t>를 저장하고</a:t>
+            </a:r>
+            <a:r>
+              <a:rPr lang="en-US" altLang="ko-KR" dirty="0"/>
+              <a:t>, new task</a:t>
+            </a:r>
+            <a:r>
+              <a:rPr lang="ko-KR" altLang="en-US" dirty="0"/>
+              <a:t>를 </a:t>
+            </a:r>
+            <a:r>
+              <a:rPr lang="en-US" altLang="ko-KR" dirty="0"/>
+              <a:t>learning</a:t>
+            </a:r>
+            <a:r>
+              <a:rPr lang="ko-KR" altLang="en-US" dirty="0"/>
+              <a:t>할 때 </a:t>
+            </a:r>
+            <a:r>
+              <a:rPr lang="en-US" altLang="ko-KR" dirty="0"/>
+              <a:t>repla</a:t>
+            </a:r>
+            <a:r>
+              <a:rPr lang="ko-KR" altLang="en-US" dirty="0"/>
+              <a:t>한다</a:t>
             </a:r>
             <a:r>
               <a:rPr lang="en-US" altLang="ko-KR" dirty="0"/>
@@ -2703,28 +3196,24 @@
           </a:p>
           <a:p>
             <a:r>
+              <a:rPr lang="ko-KR" altLang="en-US" dirty="0"/>
+              <a:t>이렇게 </a:t>
+            </a:r>
+            <a:r>
               <a:rPr lang="en-US" altLang="ko-KR" dirty="0"/>
-              <a:t>GNN</a:t>
+              <a:t>experience</a:t>
             </a:r>
             <a:r>
               <a:rPr lang="ko-KR" altLang="en-US" dirty="0"/>
-              <a:t>은 </a:t>
+              <a:t>로 사용할 노드를 선택하는 </a:t>
             </a:r>
             <a:r>
               <a:rPr lang="en-US" altLang="ko-KR" dirty="0"/>
-              <a:t>rep learning</a:t>
+              <a:t>3</a:t>
             </a:r>
             <a:r>
               <a:rPr lang="ko-KR" altLang="en-US" dirty="0"/>
-              <a:t>에 강력한 성능을 증명했고</a:t>
-            </a:r>
-            <a:r>
-              <a:rPr lang="en-US" altLang="ko-KR" dirty="0"/>
-              <a:t>.. </a:t>
-            </a:r>
-            <a:r>
-              <a:rPr lang="ko-KR" altLang="en-US" dirty="0"/>
-              <a:t>추천 데이터는 대부분 그래프 구조를 가지고 있다</a:t>
+              <a:t>가지 방법이 있다</a:t>
             </a:r>
             <a:r>
               <a:rPr lang="en-US" altLang="ko-KR" dirty="0"/>
@@ -2733,62 +3222,6 @@
           </a:p>
           <a:p>
             <a:endParaRPr lang="en-US" altLang="ko-KR" dirty="0"/>
-          </a:p>
-          <a:p>
-            <a:r>
-              <a:rPr lang="en-US" altLang="ko-KR" dirty="0"/>
-              <a:t>Information</a:t>
-            </a:r>
-            <a:r>
-              <a:rPr lang="ko-KR" altLang="en-US" dirty="0"/>
-              <a:t>의 종류와 추천 태스크 별로 카테고리를 나눌 수 있다</a:t>
-            </a:r>
-            <a:r>
-              <a:rPr lang="en-US" altLang="ko-KR" dirty="0"/>
-              <a:t>.</a:t>
-            </a:r>
-          </a:p>
-          <a:p>
-            <a:pPr marL="228600" indent="-228600">
-              <a:buAutoNum type="arabicPeriod"/>
-            </a:pPr>
-            <a:r>
-              <a:rPr lang="en-US" altLang="ko-KR" dirty="0"/>
-              <a:t>CF</a:t>
-            </a:r>
-          </a:p>
-          <a:p>
-            <a:pPr marL="228600" indent="-228600">
-              <a:buAutoNum type="arabicPeriod"/>
-            </a:pPr>
-            <a:r>
-              <a:rPr lang="ko-KR" altLang="en-US" dirty="0" err="1"/>
-              <a:t>시퀀셜</a:t>
-            </a:r>
-            <a:r>
-              <a:rPr lang="ko-KR" altLang="en-US" dirty="0"/>
-              <a:t> 추천</a:t>
-            </a:r>
-            <a:endParaRPr lang="en-US" altLang="ko-KR" dirty="0"/>
-          </a:p>
-          <a:p>
-            <a:pPr marL="228600" indent="-228600">
-              <a:buAutoNum type="arabicPeriod"/>
-            </a:pPr>
-            <a:r>
-              <a:rPr lang="ko-KR" altLang="en-US" dirty="0"/>
-              <a:t>소셜</a:t>
-            </a:r>
-            <a:endParaRPr lang="en-US" altLang="ko-KR" dirty="0"/>
-          </a:p>
-          <a:p>
-            <a:pPr marL="228600" indent="-228600">
-              <a:buAutoNum type="arabicPeriod"/>
-            </a:pPr>
-            <a:r>
-              <a:rPr lang="ko-KR" altLang="en-US" dirty="0"/>
-              <a:t>지식 그래프</a:t>
-            </a:r>
           </a:p>
         </p:txBody>
       </p:sp>
@@ -2818,7 +3251,7 @@
     </p:spTree>
     <p:extLst>
       <p:ext uri="{BB962C8B-B14F-4D97-AF65-F5344CB8AC3E}">
-        <p14:creationId xmlns:p14="http://schemas.microsoft.com/office/powerpoint/2010/main" val="2697507245"/>
+        <p14:creationId xmlns:p14="http://schemas.microsoft.com/office/powerpoint/2010/main" val="388947896"/>
       </p:ext>
     </p:extLst>
   </p:cSld>
@@ -7175,6 +7608,679 @@
                 <a:ea typeface="나눔스퀘어 ExtraBold" panose="020B0600000101010101" pitchFamily="50" charset="-127"/>
                 <a:cs typeface="Arial" panose="020B0604020202020204" pitchFamily="34" charset="0"/>
               </a:rPr>
+              <a:t>Rehearsal(experience replay) based approach</a:t>
+            </a:r>
+          </a:p>
+        </p:txBody>
+      </p:sp>
+      <p:sp>
+        <p:nvSpPr>
+          <p:cNvPr id="3" name="내용 개체 틀 2">
+            <a:extLst>
+              <a:ext uri="{FF2B5EF4-FFF2-40B4-BE49-F238E27FC236}">
+                <a16:creationId xmlns:a16="http://schemas.microsoft.com/office/drawing/2014/main" id="{6F3C4966-F49A-47DB-93D9-018CD3BE693E}"/>
+              </a:ext>
+            </a:extLst>
+          </p:cNvPr>
+          <p:cNvSpPr>
+            <a:spLocks noGrp="1"/>
+          </p:cNvSpPr>
+          <p:nvPr>
+            <p:ph idx="1"/>
+          </p:nvPr>
+        </p:nvSpPr>
+        <p:spPr>
+          <a:xfrm>
+            <a:off x="990600" y="1690688"/>
+            <a:ext cx="10515600" cy="4351338"/>
+          </a:xfrm>
+        </p:spPr>
+        <p:txBody>
+          <a:bodyPr>
+            <a:normAutofit/>
+          </a:bodyPr>
+          <a:lstStyle/>
+          <a:p>
+            <a:pPr marL="432000" indent="-432000">
+              <a:lnSpc>
+                <a:spcPct val="100000"/>
+              </a:lnSpc>
+              <a:buClr>
+                <a:srgbClr val="004F9E"/>
+              </a:buClr>
+              <a:buFont typeface="Wingdings" panose="05000000000000000000" pitchFamily="2" charset="2"/>
+              <a:buChar char="§"/>
+            </a:pPr>
+            <a:r>
+              <a:rPr lang="en-US" altLang="ko-KR" sz="2000" dirty="0">
+                <a:solidFill>
+                  <a:schemeClr val="tx1">
+                    <a:lumMod val="85000"/>
+                    <a:lumOff val="15000"/>
+                  </a:schemeClr>
+                </a:solidFill>
+                <a:latin typeface="나눔스퀘어 ExtraBold" panose="020B0600000101010101" pitchFamily="50" charset="-127"/>
+                <a:ea typeface="나눔스퀘어 ExtraBold" panose="020B0600000101010101" pitchFamily="50" charset="-127"/>
+                <a:cs typeface="Arial" panose="020B0604020202020204" pitchFamily="34" charset="0"/>
+              </a:rPr>
+              <a:t>ER-GNN (Experience Replay GNN Framework)</a:t>
+            </a:r>
+          </a:p>
+          <a:p>
+            <a:pPr marL="432000" indent="-432000">
+              <a:lnSpc>
+                <a:spcPct val="100000"/>
+              </a:lnSpc>
+              <a:buClr>
+                <a:srgbClr val="004F9E"/>
+              </a:buClr>
+              <a:buFont typeface="Wingdings" panose="05000000000000000000" pitchFamily="2" charset="2"/>
+              <a:buChar char="§"/>
+            </a:pPr>
+            <a:r>
+              <a:rPr lang="en-US" altLang="ko-KR" sz="2000" dirty="0">
+                <a:solidFill>
+                  <a:schemeClr val="tx1">
+                    <a:lumMod val="85000"/>
+                    <a:lumOff val="15000"/>
+                  </a:schemeClr>
+                </a:solidFill>
+                <a:latin typeface="나눔스퀘어 ExtraBold" panose="020B0600000101010101" pitchFamily="50" charset="-127"/>
+                <a:ea typeface="나눔스퀘어 ExtraBold" panose="020B0600000101010101" pitchFamily="50" charset="-127"/>
+                <a:cs typeface="Arial" panose="020B0604020202020204" pitchFamily="34" charset="0"/>
+              </a:rPr>
+              <a:t>ER-GNN stores knowledge from previous tasks as experiences and replays them when learning new tasks to mitigate the catastrophic forgetting issue</a:t>
+            </a:r>
+          </a:p>
+          <a:p>
+            <a:pPr marL="432000" indent="-432000">
+              <a:lnSpc>
+                <a:spcPct val="100000"/>
+              </a:lnSpc>
+              <a:buClr>
+                <a:srgbClr val="004F9E"/>
+              </a:buClr>
+              <a:buFont typeface="Wingdings" panose="05000000000000000000" pitchFamily="2" charset="2"/>
+              <a:buChar char="§"/>
+            </a:pPr>
+            <a:r>
+              <a:rPr lang="en-US" altLang="ko-KR" sz="2000" dirty="0">
+                <a:solidFill>
+                  <a:schemeClr val="tx1">
+                    <a:lumMod val="85000"/>
+                    <a:lumOff val="15000"/>
+                  </a:schemeClr>
+                </a:solidFill>
+                <a:latin typeface="나눔스퀘어 ExtraBold" panose="020B0600000101010101" pitchFamily="50" charset="-127"/>
+                <a:ea typeface="나눔스퀘어 ExtraBold" panose="020B0600000101010101" pitchFamily="50" charset="-127"/>
+                <a:cs typeface="Arial" panose="020B0604020202020204" pitchFamily="34" charset="0"/>
+              </a:rPr>
+              <a:t>three experience node selection strategies: </a:t>
+            </a:r>
+            <a:r>
+              <a:rPr lang="en-US" altLang="ko-KR" sz="2000" b="1" dirty="0">
+                <a:solidFill>
+                  <a:schemeClr val="tx1">
+                    <a:lumMod val="85000"/>
+                    <a:lumOff val="15000"/>
+                  </a:schemeClr>
+                </a:solidFill>
+                <a:latin typeface="나눔스퀘어 ExtraBold" panose="020B0600000101010101" pitchFamily="50" charset="-127"/>
+                <a:ea typeface="나눔스퀘어 ExtraBold" panose="020B0600000101010101" pitchFamily="50" charset="-127"/>
+                <a:cs typeface="Arial" panose="020B0604020202020204" pitchFamily="34" charset="0"/>
+              </a:rPr>
+              <a:t>mean of feature</a:t>
+            </a:r>
+            <a:r>
+              <a:rPr lang="en-US" altLang="ko-KR" sz="2000" dirty="0">
+                <a:solidFill>
+                  <a:schemeClr val="tx1">
+                    <a:lumMod val="85000"/>
+                    <a:lumOff val="15000"/>
+                  </a:schemeClr>
+                </a:solidFill>
+                <a:latin typeface="나눔스퀘어 ExtraBold" panose="020B0600000101010101" pitchFamily="50" charset="-127"/>
+                <a:ea typeface="나눔스퀘어 ExtraBold" panose="020B0600000101010101" pitchFamily="50" charset="-127"/>
+                <a:cs typeface="Arial" panose="020B0604020202020204" pitchFamily="34" charset="0"/>
+              </a:rPr>
+              <a:t>, </a:t>
+            </a:r>
+            <a:r>
+              <a:rPr lang="en-US" altLang="ko-KR" sz="2000" b="1" dirty="0">
+                <a:solidFill>
+                  <a:schemeClr val="tx1">
+                    <a:lumMod val="85000"/>
+                    <a:lumOff val="15000"/>
+                  </a:schemeClr>
+                </a:solidFill>
+                <a:latin typeface="나눔스퀘어 ExtraBold" panose="020B0600000101010101" pitchFamily="50" charset="-127"/>
+                <a:ea typeface="나눔스퀘어 ExtraBold" panose="020B0600000101010101" pitchFamily="50" charset="-127"/>
+                <a:cs typeface="Arial" panose="020B0604020202020204" pitchFamily="34" charset="0"/>
+              </a:rPr>
+              <a:t>coverage maximization</a:t>
+            </a:r>
+            <a:r>
+              <a:rPr lang="en-US" altLang="ko-KR" sz="2000" dirty="0">
+                <a:solidFill>
+                  <a:schemeClr val="tx1">
+                    <a:lumMod val="85000"/>
+                    <a:lumOff val="15000"/>
+                  </a:schemeClr>
+                </a:solidFill>
+                <a:latin typeface="나눔스퀘어 ExtraBold" panose="020B0600000101010101" pitchFamily="50" charset="-127"/>
+                <a:ea typeface="나눔스퀘어 ExtraBold" panose="020B0600000101010101" pitchFamily="50" charset="-127"/>
+                <a:cs typeface="Arial" panose="020B0604020202020204" pitchFamily="34" charset="0"/>
+              </a:rPr>
+              <a:t>, and </a:t>
+            </a:r>
+            <a:r>
+              <a:rPr lang="en-US" altLang="ko-KR" sz="2000" b="1" dirty="0">
+                <a:solidFill>
+                  <a:schemeClr val="tx1">
+                    <a:lumMod val="85000"/>
+                    <a:lumOff val="15000"/>
+                  </a:schemeClr>
+                </a:solidFill>
+                <a:latin typeface="나눔스퀘어 ExtraBold" panose="020B0600000101010101" pitchFamily="50" charset="-127"/>
+                <a:ea typeface="나눔스퀘어 ExtraBold" panose="020B0600000101010101" pitchFamily="50" charset="-127"/>
+                <a:cs typeface="Arial" panose="020B0604020202020204" pitchFamily="34" charset="0"/>
+              </a:rPr>
+              <a:t>influence maximization</a:t>
+            </a:r>
+            <a:r>
+              <a:rPr lang="en-US" altLang="ko-KR" sz="2000" dirty="0">
+                <a:solidFill>
+                  <a:schemeClr val="tx1">
+                    <a:lumMod val="85000"/>
+                    <a:lumOff val="15000"/>
+                  </a:schemeClr>
+                </a:solidFill>
+                <a:latin typeface="나눔스퀘어 ExtraBold" panose="020B0600000101010101" pitchFamily="50" charset="-127"/>
+                <a:ea typeface="나눔스퀘어 ExtraBold" panose="020B0600000101010101" pitchFamily="50" charset="-127"/>
+                <a:cs typeface="Arial" panose="020B0604020202020204" pitchFamily="34" charset="0"/>
+              </a:rPr>
+              <a:t>, to guide the process of selecting experience nodes</a:t>
+            </a:r>
+          </a:p>
+        </p:txBody>
+      </p:sp>
+      <p:sp>
+        <p:nvSpPr>
+          <p:cNvPr id="4" name="슬라이드 번호 개체 틀 3">
+            <a:extLst>
+              <a:ext uri="{FF2B5EF4-FFF2-40B4-BE49-F238E27FC236}">
+                <a16:creationId xmlns:a16="http://schemas.microsoft.com/office/drawing/2014/main" id="{4705CCFD-CA4E-4794-89D0-C3DF4603C893}"/>
+              </a:ext>
+            </a:extLst>
+          </p:cNvPr>
+          <p:cNvSpPr>
+            <a:spLocks noGrp="1"/>
+          </p:cNvSpPr>
+          <p:nvPr>
+            <p:ph type="sldNum" sz="quarter" idx="12"/>
+          </p:nvPr>
+        </p:nvSpPr>
+        <p:spPr/>
+        <p:txBody>
+          <a:bodyPr/>
+          <a:lstStyle/>
+          <a:p>
+            <a:fld id="{16A93642-25BD-4471-A422-0159119E9512}" type="slidenum">
+              <a:rPr lang="ko-KR" altLang="en-US" smtClean="0"/>
+              <a:pPr/>
+              <a:t>10</a:t>
+            </a:fld>
+            <a:endParaRPr lang="ko-KR" altLang="en-US" dirty="0"/>
+          </a:p>
+        </p:txBody>
+      </p:sp>
+    </p:spTree>
+    <p:extLst>
+      <p:ext uri="{BB962C8B-B14F-4D97-AF65-F5344CB8AC3E}">
+        <p14:creationId xmlns:p14="http://schemas.microsoft.com/office/powerpoint/2010/main" val="3817165178"/>
+      </p:ext>
+    </p:extLst>
+  </p:cSld>
+  <p:clrMapOvr>
+    <a:masterClrMapping/>
+  </p:clrMapOvr>
+</p:sld>
+</file>
+
+<file path=ppt/slides/slide11.xml><?xml version="1.0" encoding="utf-8"?>
+<p:sld xmlns:a="http://schemas.openxmlformats.org/drawingml/2006/main" xmlns:r="http://schemas.openxmlformats.org/officeDocument/2006/relationships" xmlns:p="http://schemas.openxmlformats.org/presentationml/2006/main">
+  <p:cSld>
+    <p:spTree>
+      <p:nvGrpSpPr>
+        <p:cNvPr id="1" name=""/>
+        <p:cNvGrpSpPr/>
+        <p:nvPr/>
+      </p:nvGrpSpPr>
+      <p:grpSpPr>
+        <a:xfrm>
+          <a:off x="0" y="0"/>
+          <a:ext cx="0" cy="0"/>
+          <a:chOff x="0" y="0"/>
+          <a:chExt cx="0" cy="0"/>
+        </a:xfrm>
+      </p:grpSpPr>
+      <p:sp>
+        <p:nvSpPr>
+          <p:cNvPr id="2" name="제목 1">
+            <a:extLst>
+              <a:ext uri="{FF2B5EF4-FFF2-40B4-BE49-F238E27FC236}">
+                <a16:creationId xmlns:a16="http://schemas.microsoft.com/office/drawing/2014/main" id="{95CB7AEF-6056-404F-8222-D7A0008FE999}"/>
+              </a:ext>
+            </a:extLst>
+          </p:cNvPr>
+          <p:cNvSpPr>
+            <a:spLocks noGrp="1"/>
+          </p:cNvSpPr>
+          <p:nvPr>
+            <p:ph type="title"/>
+          </p:nvPr>
+        </p:nvSpPr>
+        <p:spPr/>
+        <p:txBody>
+          <a:bodyPr>
+            <a:normAutofit/>
+          </a:bodyPr>
+          <a:lstStyle/>
+          <a:p>
+            <a:pPr marL="432000" indent="-432000">
+              <a:lnSpc>
+                <a:spcPct val="100000"/>
+              </a:lnSpc>
+              <a:buClr>
+                <a:srgbClr val="004F9E"/>
+              </a:buClr>
+              <a:buFont typeface="Wingdings" panose="05000000000000000000" pitchFamily="2" charset="2"/>
+              <a:buChar char="§"/>
+            </a:pPr>
+            <a:r>
+              <a:rPr lang="en-US" altLang="ko-KR" sz="3600" dirty="0">
+                <a:solidFill>
+                  <a:schemeClr val="tx1">
+                    <a:lumMod val="85000"/>
+                    <a:lumOff val="15000"/>
+                  </a:schemeClr>
+                </a:solidFill>
+                <a:latin typeface="나눔스퀘어 ExtraBold" panose="020B0600000101010101" pitchFamily="50" charset="-127"/>
+                <a:ea typeface="나눔스퀘어 ExtraBold" panose="020B0600000101010101" pitchFamily="50" charset="-127"/>
+                <a:cs typeface="Arial" panose="020B0604020202020204" pitchFamily="34" charset="0"/>
+              </a:rPr>
+              <a:t>Rehearsal(experience replay) based approach</a:t>
+            </a:r>
+          </a:p>
+        </p:txBody>
+      </p:sp>
+      <p:sp>
+        <p:nvSpPr>
+          <p:cNvPr id="3" name="내용 개체 틀 2">
+            <a:extLst>
+              <a:ext uri="{FF2B5EF4-FFF2-40B4-BE49-F238E27FC236}">
+                <a16:creationId xmlns:a16="http://schemas.microsoft.com/office/drawing/2014/main" id="{6F3C4966-F49A-47DB-93D9-018CD3BE693E}"/>
+              </a:ext>
+            </a:extLst>
+          </p:cNvPr>
+          <p:cNvSpPr>
+            <a:spLocks noGrp="1"/>
+          </p:cNvSpPr>
+          <p:nvPr>
+            <p:ph idx="1"/>
+          </p:nvPr>
+        </p:nvSpPr>
+        <p:spPr>
+          <a:xfrm>
+            <a:off x="990600" y="1690688"/>
+            <a:ext cx="10515600" cy="4351338"/>
+          </a:xfrm>
+        </p:spPr>
+        <p:txBody>
+          <a:bodyPr>
+            <a:normAutofit/>
+          </a:bodyPr>
+          <a:lstStyle/>
+          <a:p>
+            <a:pPr marL="432000" indent="-432000">
+              <a:lnSpc>
+                <a:spcPct val="100000"/>
+              </a:lnSpc>
+              <a:buClr>
+                <a:srgbClr val="004F9E"/>
+              </a:buClr>
+              <a:buFont typeface="Wingdings" panose="05000000000000000000" pitchFamily="2" charset="2"/>
+              <a:buChar char="§"/>
+            </a:pPr>
+            <a:r>
+              <a:rPr lang="en-US" altLang="ko-KR" sz="2000" dirty="0">
+                <a:solidFill>
+                  <a:schemeClr val="tx1">
+                    <a:lumMod val="85000"/>
+                    <a:lumOff val="15000"/>
+                  </a:schemeClr>
+                </a:solidFill>
+                <a:latin typeface="나눔스퀘어 ExtraBold" panose="020B0600000101010101" pitchFamily="50" charset="-127"/>
+                <a:ea typeface="나눔스퀘어 ExtraBold" panose="020B0600000101010101" pitchFamily="50" charset="-127"/>
+                <a:cs typeface="Arial" panose="020B0604020202020204" pitchFamily="34" charset="0"/>
+              </a:rPr>
+              <a:t>Lifelong Open-world node classification</a:t>
+            </a:r>
+          </a:p>
+        </p:txBody>
+      </p:sp>
+      <p:sp>
+        <p:nvSpPr>
+          <p:cNvPr id="4" name="슬라이드 번호 개체 틀 3">
+            <a:extLst>
+              <a:ext uri="{FF2B5EF4-FFF2-40B4-BE49-F238E27FC236}">
+                <a16:creationId xmlns:a16="http://schemas.microsoft.com/office/drawing/2014/main" id="{4705CCFD-CA4E-4794-89D0-C3DF4603C893}"/>
+              </a:ext>
+            </a:extLst>
+          </p:cNvPr>
+          <p:cNvSpPr>
+            <a:spLocks noGrp="1"/>
+          </p:cNvSpPr>
+          <p:nvPr>
+            <p:ph type="sldNum" sz="quarter" idx="12"/>
+          </p:nvPr>
+        </p:nvSpPr>
+        <p:spPr/>
+        <p:txBody>
+          <a:bodyPr/>
+          <a:lstStyle/>
+          <a:p>
+            <a:fld id="{16A93642-25BD-4471-A422-0159119E9512}" type="slidenum">
+              <a:rPr lang="ko-KR" altLang="en-US" smtClean="0"/>
+              <a:pPr/>
+              <a:t>11</a:t>
+            </a:fld>
+            <a:endParaRPr lang="ko-KR" altLang="en-US" dirty="0"/>
+          </a:p>
+        </p:txBody>
+      </p:sp>
+    </p:spTree>
+    <p:extLst>
+      <p:ext uri="{BB962C8B-B14F-4D97-AF65-F5344CB8AC3E}">
+        <p14:creationId xmlns:p14="http://schemas.microsoft.com/office/powerpoint/2010/main" val="3086927590"/>
+      </p:ext>
+    </p:extLst>
+  </p:cSld>
+  <p:clrMapOvr>
+    <a:masterClrMapping/>
+  </p:clrMapOvr>
+</p:sld>
+</file>
+
+<file path=ppt/slides/slide12.xml><?xml version="1.0" encoding="utf-8"?>
+<p:sld xmlns:a="http://schemas.openxmlformats.org/drawingml/2006/main" xmlns:r="http://schemas.openxmlformats.org/officeDocument/2006/relationships" xmlns:p="http://schemas.openxmlformats.org/presentationml/2006/main">
+  <p:cSld>
+    <p:spTree>
+      <p:nvGrpSpPr>
+        <p:cNvPr id="1" name=""/>
+        <p:cNvGrpSpPr/>
+        <p:nvPr/>
+      </p:nvGrpSpPr>
+      <p:grpSpPr>
+        <a:xfrm>
+          <a:off x="0" y="0"/>
+          <a:ext cx="0" cy="0"/>
+          <a:chOff x="0" y="0"/>
+          <a:chExt cx="0" cy="0"/>
+        </a:xfrm>
+      </p:grpSpPr>
+      <p:sp>
+        <p:nvSpPr>
+          <p:cNvPr id="2" name="제목 1">
+            <a:extLst>
+              <a:ext uri="{FF2B5EF4-FFF2-40B4-BE49-F238E27FC236}">
+                <a16:creationId xmlns:a16="http://schemas.microsoft.com/office/drawing/2014/main" id="{95CB7AEF-6056-404F-8222-D7A0008FE999}"/>
+              </a:ext>
+            </a:extLst>
+          </p:cNvPr>
+          <p:cNvSpPr>
+            <a:spLocks noGrp="1"/>
+          </p:cNvSpPr>
+          <p:nvPr>
+            <p:ph type="title"/>
+          </p:nvPr>
+        </p:nvSpPr>
+        <p:spPr/>
+        <p:txBody>
+          <a:bodyPr>
+            <a:normAutofit/>
+          </a:bodyPr>
+          <a:lstStyle/>
+          <a:p>
+            <a:pPr marL="432000" indent="-432000">
+              <a:lnSpc>
+                <a:spcPct val="100000"/>
+              </a:lnSpc>
+              <a:buClr>
+                <a:srgbClr val="004F9E"/>
+              </a:buClr>
+              <a:buFont typeface="Wingdings" panose="05000000000000000000" pitchFamily="2" charset="2"/>
+              <a:buChar char="§"/>
+            </a:pPr>
+            <a:r>
+              <a:rPr lang="en-US" altLang="ko-KR" sz="3600" dirty="0">
+                <a:solidFill>
+                  <a:schemeClr val="tx1">
+                    <a:lumMod val="85000"/>
+                    <a:lumOff val="15000"/>
+                  </a:schemeClr>
+                </a:solidFill>
+                <a:latin typeface="나눔스퀘어 ExtraBold" panose="020B0600000101010101" pitchFamily="50" charset="-127"/>
+                <a:ea typeface="나눔스퀘어 ExtraBold" panose="020B0600000101010101" pitchFamily="50" charset="-127"/>
+                <a:cs typeface="Arial" panose="020B0604020202020204" pitchFamily="34" charset="0"/>
+              </a:rPr>
+              <a:t>Regularization based approach</a:t>
+            </a:r>
+          </a:p>
+        </p:txBody>
+      </p:sp>
+      <p:sp>
+        <p:nvSpPr>
+          <p:cNvPr id="3" name="내용 개체 틀 2">
+            <a:extLst>
+              <a:ext uri="{FF2B5EF4-FFF2-40B4-BE49-F238E27FC236}">
+                <a16:creationId xmlns:a16="http://schemas.microsoft.com/office/drawing/2014/main" id="{6F3C4966-F49A-47DB-93D9-018CD3BE693E}"/>
+              </a:ext>
+            </a:extLst>
+          </p:cNvPr>
+          <p:cNvSpPr>
+            <a:spLocks noGrp="1"/>
+          </p:cNvSpPr>
+          <p:nvPr>
+            <p:ph idx="1"/>
+          </p:nvPr>
+        </p:nvSpPr>
+        <p:spPr>
+          <a:xfrm>
+            <a:off x="990600" y="1690688"/>
+            <a:ext cx="10515600" cy="4351338"/>
+          </a:xfrm>
+        </p:spPr>
+        <p:txBody>
+          <a:bodyPr>
+            <a:normAutofit/>
+          </a:bodyPr>
+          <a:lstStyle/>
+          <a:p>
+            <a:pPr marL="432000" indent="-432000">
+              <a:lnSpc>
+                <a:spcPct val="100000"/>
+              </a:lnSpc>
+              <a:buClr>
+                <a:srgbClr val="004F9E"/>
+              </a:buClr>
+              <a:buFont typeface="Wingdings" panose="05000000000000000000" pitchFamily="2" charset="2"/>
+              <a:buChar char="§"/>
+            </a:pPr>
+            <a:r>
+              <a:rPr lang="en-US" altLang="ko-KR" sz="2000" dirty="0">
+                <a:solidFill>
+                  <a:schemeClr val="tx1">
+                    <a:lumMod val="85000"/>
+                    <a:lumOff val="15000"/>
+                  </a:schemeClr>
+                </a:solidFill>
+                <a:latin typeface="나눔스퀘어 ExtraBold" panose="020B0600000101010101" pitchFamily="50" charset="-127"/>
+                <a:ea typeface="나눔스퀘어 ExtraBold" panose="020B0600000101010101" pitchFamily="50" charset="-127"/>
+                <a:cs typeface="Arial" panose="020B0604020202020204" pitchFamily="34" charset="0"/>
+              </a:rPr>
+              <a:t>This approach implements a single model and has a fixed capacity by leveraging the loss function </a:t>
+            </a:r>
+            <a:r>
+              <a:rPr lang="en-US" altLang="ko-KR" sz="2000" b="1" dirty="0">
+                <a:solidFill>
+                  <a:schemeClr val="tx1">
+                    <a:lumMod val="85000"/>
+                    <a:lumOff val="15000"/>
+                  </a:schemeClr>
+                </a:solidFill>
+                <a:latin typeface="나눔스퀘어 ExtraBold" panose="020B0600000101010101" pitchFamily="50" charset="-127"/>
+                <a:ea typeface="나눔스퀘어 ExtraBold" panose="020B0600000101010101" pitchFamily="50" charset="-127"/>
+                <a:cs typeface="Arial" panose="020B0604020202020204" pitchFamily="34" charset="0"/>
+              </a:rPr>
+              <a:t>using the loss term </a:t>
+            </a:r>
+            <a:r>
+              <a:rPr lang="en-US" altLang="ko-KR" sz="2000" dirty="0">
+                <a:solidFill>
+                  <a:schemeClr val="tx1">
+                    <a:lumMod val="85000"/>
+                    <a:lumOff val="15000"/>
+                  </a:schemeClr>
+                </a:solidFill>
+                <a:latin typeface="나눔스퀘어 ExtraBold" panose="020B0600000101010101" pitchFamily="50" charset="-127"/>
+                <a:ea typeface="나눔스퀘어 ExtraBold" panose="020B0600000101010101" pitchFamily="50" charset="-127"/>
+                <a:cs typeface="Arial" panose="020B0604020202020204" pitchFamily="34" charset="0"/>
+              </a:rPr>
+              <a:t>to help consolidate knowledge in the learning process for new tasks and </a:t>
+            </a:r>
+            <a:r>
+              <a:rPr lang="en-US" altLang="ko-KR" sz="2000" b="1" dirty="0">
+                <a:solidFill>
+                  <a:schemeClr val="tx1">
+                    <a:lumMod val="85000"/>
+                    <a:lumOff val="15000"/>
+                  </a:schemeClr>
+                </a:solidFill>
+                <a:latin typeface="나눔스퀘어 ExtraBold" panose="020B0600000101010101" pitchFamily="50" charset="-127"/>
+                <a:ea typeface="나눔스퀘어 ExtraBold" panose="020B0600000101010101" pitchFamily="50" charset="-127"/>
+                <a:cs typeface="Arial" panose="020B0604020202020204" pitchFamily="34" charset="0"/>
+              </a:rPr>
+              <a:t>retain previous knowledge</a:t>
+            </a:r>
+          </a:p>
+        </p:txBody>
+      </p:sp>
+      <p:sp>
+        <p:nvSpPr>
+          <p:cNvPr id="4" name="슬라이드 번호 개체 틀 3">
+            <a:extLst>
+              <a:ext uri="{FF2B5EF4-FFF2-40B4-BE49-F238E27FC236}">
+                <a16:creationId xmlns:a16="http://schemas.microsoft.com/office/drawing/2014/main" id="{4705CCFD-CA4E-4794-89D0-C3DF4603C893}"/>
+              </a:ext>
+            </a:extLst>
+          </p:cNvPr>
+          <p:cNvSpPr>
+            <a:spLocks noGrp="1"/>
+          </p:cNvSpPr>
+          <p:nvPr>
+            <p:ph type="sldNum" sz="quarter" idx="12"/>
+          </p:nvPr>
+        </p:nvSpPr>
+        <p:spPr/>
+        <p:txBody>
+          <a:bodyPr/>
+          <a:lstStyle/>
+          <a:p>
+            <a:fld id="{16A93642-25BD-4471-A422-0159119E9512}" type="slidenum">
+              <a:rPr lang="ko-KR" altLang="en-US" smtClean="0"/>
+              <a:pPr/>
+              <a:t>12</a:t>
+            </a:fld>
+            <a:endParaRPr lang="ko-KR" altLang="en-US" dirty="0"/>
+          </a:p>
+        </p:txBody>
+      </p:sp>
+    </p:spTree>
+    <p:extLst>
+      <p:ext uri="{BB962C8B-B14F-4D97-AF65-F5344CB8AC3E}">
+        <p14:creationId xmlns:p14="http://schemas.microsoft.com/office/powerpoint/2010/main" val="2473855550"/>
+      </p:ext>
+    </p:extLst>
+  </p:cSld>
+  <p:clrMapOvr>
+    <a:masterClrMapping/>
+  </p:clrMapOvr>
+</p:sld>
+</file>
+
+<file path=ppt/slides/slide13.xml><?xml version="1.0" encoding="utf-8"?>
+<p:sld xmlns:a="http://schemas.openxmlformats.org/drawingml/2006/main" xmlns:r="http://schemas.openxmlformats.org/officeDocument/2006/relationships" xmlns:p="http://schemas.openxmlformats.org/presentationml/2006/main">
+  <p:cSld>
+    <p:spTree>
+      <p:nvGrpSpPr>
+        <p:cNvPr id="1" name=""/>
+        <p:cNvGrpSpPr/>
+        <p:nvPr/>
+      </p:nvGrpSpPr>
+      <p:grpSpPr>
+        <a:xfrm>
+          <a:off x="0" y="0"/>
+          <a:ext cx="0" cy="0"/>
+          <a:chOff x="0" y="0"/>
+          <a:chExt cx="0" cy="0"/>
+        </a:xfrm>
+      </p:grpSpPr>
+      <p:sp>
+        <p:nvSpPr>
+          <p:cNvPr id="2" name="제목 1">
+            <a:extLst>
+              <a:ext uri="{FF2B5EF4-FFF2-40B4-BE49-F238E27FC236}">
+                <a16:creationId xmlns:a16="http://schemas.microsoft.com/office/drawing/2014/main" id="{95CB7AEF-6056-404F-8222-D7A0008FE999}"/>
+              </a:ext>
+            </a:extLst>
+          </p:cNvPr>
+          <p:cNvSpPr>
+            <a:spLocks noGrp="1"/>
+          </p:cNvSpPr>
+          <p:nvPr>
+            <p:ph type="title"/>
+          </p:nvPr>
+        </p:nvSpPr>
+        <p:spPr/>
+        <p:txBody>
+          <a:bodyPr>
+            <a:normAutofit/>
+          </a:bodyPr>
+          <a:lstStyle/>
+          <a:p>
+            <a:pPr marL="432000" indent="-432000">
+              <a:lnSpc>
+                <a:spcPct val="100000"/>
+              </a:lnSpc>
+              <a:buClr>
+                <a:srgbClr val="004F9E"/>
+              </a:buClr>
+              <a:buFont typeface="Wingdings" panose="05000000000000000000" pitchFamily="2" charset="2"/>
+              <a:buChar char="§"/>
+            </a:pPr>
+            <a:r>
+              <a:rPr lang="en-US" altLang="ko-KR" sz="3600" dirty="0">
+                <a:solidFill>
+                  <a:schemeClr val="tx1">
+                    <a:lumMod val="85000"/>
+                    <a:lumOff val="15000"/>
+                  </a:schemeClr>
+                </a:solidFill>
+                <a:latin typeface="나눔스퀘어 ExtraBold" panose="020B0600000101010101" pitchFamily="50" charset="-127"/>
+                <a:ea typeface="나눔스퀘어 ExtraBold" panose="020B0600000101010101" pitchFamily="50" charset="-127"/>
+                <a:cs typeface="Arial" panose="020B0604020202020204" pitchFamily="34" charset="0"/>
+              </a:rPr>
               <a:t>GNN + </a:t>
             </a:r>
             <a:r>
@@ -7437,7 +8543,7 @@
             <a:fld id="{16A93642-25BD-4471-A422-0159119E9512}" type="slidenum">
               <a:rPr lang="ko-KR" altLang="en-US" smtClean="0"/>
               <a:pPr/>
-              <a:t>10</a:t>
+              <a:t>13</a:t>
             </a:fld>
             <a:endParaRPr lang="ko-KR" altLang="en-US" dirty="0"/>
           </a:p>
@@ -7486,7 +8592,7 @@
 </p:sld>
 </file>
 
-<file path=ppt/slides/slide11.xml><?xml version="1.0" encoding="utf-8"?>
+<file path=ppt/slides/slide14.xml><?xml version="1.0" encoding="utf-8"?>
 <p:sld xmlns:a="http://schemas.openxmlformats.org/drawingml/2006/main" xmlns:r="http://schemas.openxmlformats.org/officeDocument/2006/relationships" xmlns:p="http://schemas.openxmlformats.org/presentationml/2006/main">
   <p:cSld>
     <p:spTree>
@@ -7629,7 +8735,7 @@
             <a:fld id="{16A93642-25BD-4471-A422-0159119E9512}" type="slidenum">
               <a:rPr lang="ko-KR" altLang="en-US" smtClean="0"/>
               <a:pPr/>
-              <a:t>11</a:t>
+              <a:t>14</a:t>
             </a:fld>
             <a:endParaRPr lang="ko-KR" altLang="en-US" dirty="0"/>
           </a:p>
@@ -7648,7 +8754,7 @@
 </p:sld>
 </file>
 
-<file path=ppt/slides/slide12.xml><?xml version="1.0" encoding="utf-8"?>
+<file path=ppt/slides/slide15.xml><?xml version="1.0" encoding="utf-8"?>
 <p:sld xmlns:a="http://schemas.openxmlformats.org/drawingml/2006/main" xmlns:r="http://schemas.openxmlformats.org/officeDocument/2006/relationships" xmlns:p="http://schemas.openxmlformats.org/presentationml/2006/main">
   <p:cSld>
     <p:spTree>
@@ -8007,7 +9113,7 @@
             <a:fld id="{16A93642-25BD-4471-A422-0159119E9512}" type="slidenum">
               <a:rPr lang="ko-KR" altLang="en-US" smtClean="0"/>
               <a:pPr/>
-              <a:t>12</a:t>
+              <a:t>15</a:t>
             </a:fld>
             <a:endParaRPr lang="ko-KR" altLang="en-US" dirty="0"/>
           </a:p>
@@ -8056,7 +9162,7 @@
 </p:sld>
 </file>
 
-<file path=ppt/slides/slide13.xml><?xml version="1.0" encoding="utf-8"?>
+<file path=ppt/slides/slide16.xml><?xml version="1.0" encoding="utf-8"?>
 <p:sld xmlns:a="http://schemas.openxmlformats.org/drawingml/2006/main" xmlns:r="http://schemas.openxmlformats.org/officeDocument/2006/relationships" xmlns:p="http://schemas.openxmlformats.org/presentationml/2006/main">
   <p:cSld>
     <p:spTree>
@@ -8276,7 +9382,7 @@
                 <a:ea typeface="나눔스퀘어 ExtraBold" panose="020B0600000101010101" pitchFamily="50" charset="-127"/>
                 <a:cs typeface="Arial" panose="020B0604020202020204" pitchFamily="34" charset="0"/>
               </a:rPr>
-              <a:t>How about add Rehearsal based approach like </a:t>
+              <a:t>How about add Rehearsal(Experience replay) based approach like </a:t>
             </a:r>
             <a:r>
               <a:rPr lang="en-US" altLang="ko-KR" sz="2000" dirty="0" err="1">
@@ -8344,7 +9450,7 @@
             <a:fld id="{16A93642-25BD-4471-A422-0159119E9512}" type="slidenum">
               <a:rPr lang="ko-KR" altLang="en-US" smtClean="0"/>
               <a:pPr/>
-              <a:t>13</a:t>
+              <a:t>16</a:t>
             </a:fld>
             <a:endParaRPr lang="ko-KR" altLang="en-US" dirty="0"/>
           </a:p>
@@ -8363,7 +9469,7 @@
 </p:sld>
 </file>
 
-<file path=ppt/slides/slide14.xml><?xml version="1.0" encoding="utf-8"?>
+<file path=ppt/slides/slide17.xml><?xml version="1.0" encoding="utf-8"?>
 <p:sld xmlns:a="http://schemas.openxmlformats.org/drawingml/2006/main" xmlns:r="http://schemas.openxmlformats.org/officeDocument/2006/relationships" xmlns:p="http://schemas.openxmlformats.org/presentationml/2006/main">
   <p:cSld>
     <p:spTree>
@@ -8506,7 +9612,7 @@
             <a:fld id="{16A93642-25BD-4471-A422-0159119E9512}" type="slidenum">
               <a:rPr lang="ko-KR" altLang="en-US" smtClean="0"/>
               <a:pPr/>
-              <a:t>14</a:t>
+              <a:t>17</a:t>
             </a:fld>
             <a:endParaRPr lang="ko-KR" altLang="en-US" dirty="0"/>
           </a:p>
@@ -8525,7 +9631,7 @@
 </p:sld>
 </file>
 
-<file path=ppt/slides/slide15.xml><?xml version="1.0" encoding="utf-8"?>
+<file path=ppt/slides/slide18.xml><?xml version="1.0" encoding="utf-8"?>
 <p:sld xmlns:a="http://schemas.openxmlformats.org/drawingml/2006/main" xmlns:r="http://schemas.openxmlformats.org/officeDocument/2006/relationships" xmlns:p="http://schemas.openxmlformats.org/presentationml/2006/main">
   <p:cSld>
     <p:spTree>
@@ -8668,7 +9774,7 @@
             <a:fld id="{16A93642-25BD-4471-A422-0159119E9512}" type="slidenum">
               <a:rPr lang="ko-KR" altLang="en-US" smtClean="0"/>
               <a:pPr/>
-              <a:t>15</a:t>
+              <a:t>18</a:t>
             </a:fld>
             <a:endParaRPr lang="ko-KR" altLang="en-US" dirty="0"/>
           </a:p>
@@ -8687,7 +9793,7 @@
 </p:sld>
 </file>
 
-<file path=ppt/slides/slide16.xml><?xml version="1.0" encoding="utf-8"?>
+<file path=ppt/slides/slide19.xml><?xml version="1.0" encoding="utf-8"?>
 <p:sld xmlns:a="http://schemas.openxmlformats.org/drawingml/2006/main" xmlns:r="http://schemas.openxmlformats.org/officeDocument/2006/relationships" xmlns:p="http://schemas.openxmlformats.org/presentationml/2006/main">
   <p:cSld>
     <p:spTree>
@@ -8830,7 +9936,7 @@
             <a:fld id="{16A93642-25BD-4471-A422-0159119E9512}" type="slidenum">
               <a:rPr lang="ko-KR" altLang="en-US" smtClean="0"/>
               <a:pPr/>
-              <a:t>16</a:t>
+              <a:t>19</a:t>
             </a:fld>
             <a:endParaRPr lang="ko-KR" altLang="en-US" dirty="0"/>
           </a:p>
@@ -10564,17 +11670,72 @@
               <a:buFont typeface="Wingdings" panose="05000000000000000000" pitchFamily="2" charset="2"/>
               <a:buChar char="§"/>
             </a:pPr>
-            <a:endParaRPr lang="en-US" altLang="ko-KR" sz="1800" dirty="0">
-              <a:solidFill>
-                <a:schemeClr val="tx1">
-                  <a:lumMod val="85000"/>
-                  <a:lumOff val="15000"/>
-                </a:schemeClr>
-              </a:solidFill>
-              <a:latin typeface="나눔스퀘어 ExtraBold" panose="020B0600000101010101" pitchFamily="50" charset="-127"/>
-              <a:ea typeface="나눔스퀘어 ExtraBold" panose="020B0600000101010101" pitchFamily="50" charset="-127"/>
-              <a:cs typeface="Arial" panose="020B0604020202020204" pitchFamily="34" charset="0"/>
-            </a:endParaRPr>
+            <a:r>
+              <a:rPr lang="en-US" altLang="ko-KR" sz="1800" dirty="0">
+                <a:solidFill>
+                  <a:schemeClr val="tx1">
+                    <a:lumMod val="85000"/>
+                    <a:lumOff val="15000"/>
+                  </a:schemeClr>
+                </a:solidFill>
+                <a:latin typeface="나눔스퀘어 ExtraBold" panose="020B0600000101010101" pitchFamily="50" charset="-127"/>
+                <a:ea typeface="나눔스퀘어 ExtraBold" panose="020B0600000101010101" pitchFamily="50" charset="-127"/>
+                <a:cs typeface="Arial" panose="020B0604020202020204" pitchFamily="34" charset="0"/>
+              </a:rPr>
+              <a:t>This approach focuses on modifying the specific architecture of networks.</a:t>
+            </a:r>
+          </a:p>
+          <a:p>
+            <a:pPr marL="432000" indent="-432000">
+              <a:lnSpc>
+                <a:spcPct val="100000"/>
+              </a:lnSpc>
+              <a:buClr>
+                <a:srgbClr val="004F9E"/>
+              </a:buClr>
+              <a:buFont typeface="Wingdings" panose="05000000000000000000" pitchFamily="2" charset="2"/>
+              <a:buChar char="§"/>
+            </a:pPr>
+            <a:r>
+              <a:rPr lang="en-US" altLang="ko-KR" sz="1800" dirty="0">
+                <a:solidFill>
+                  <a:schemeClr val="tx1">
+                    <a:lumMod val="85000"/>
+                    <a:lumOff val="15000"/>
+                  </a:schemeClr>
+                </a:solidFill>
+                <a:latin typeface="나눔스퀘어 ExtraBold" panose="020B0600000101010101" pitchFamily="50" charset="-127"/>
+                <a:ea typeface="나눔스퀘어 ExtraBold" panose="020B0600000101010101" pitchFamily="50" charset="-127"/>
+                <a:cs typeface="Arial" panose="020B0604020202020204" pitchFamily="34" charset="0"/>
+              </a:rPr>
+              <a:t>Activation functions, layers of algorithms to address a new task and prevent the forgetting of previous tasks.</a:t>
+            </a:r>
+          </a:p>
+          <a:p>
+            <a:pPr marL="432000" indent="-432000">
+              <a:lnSpc>
+                <a:spcPct val="100000"/>
+              </a:lnSpc>
+              <a:buClr>
+                <a:srgbClr val="004F9E"/>
+              </a:buClr>
+              <a:buFont typeface="Wingdings" panose="05000000000000000000" pitchFamily="2" charset="2"/>
+              <a:buChar char="§"/>
+            </a:pPr>
+            <a:r>
+              <a:rPr lang="en-US" altLang="ko-KR" sz="1800" dirty="0">
+                <a:solidFill>
+                  <a:schemeClr val="tx1">
+                    <a:lumMod val="85000"/>
+                    <a:lumOff val="15000"/>
+                  </a:schemeClr>
+                </a:solidFill>
+                <a:latin typeface="나눔스퀘어 ExtraBold" panose="020B0600000101010101" pitchFamily="50" charset="-127"/>
+                <a:ea typeface="나눔스퀘어 ExtraBold" panose="020B0600000101010101" pitchFamily="50" charset="-127"/>
+                <a:cs typeface="Arial" panose="020B0604020202020204" pitchFamily="34" charset="0"/>
+              </a:rPr>
+              <a:t>Like FGN, HPNs</a:t>
+            </a:r>
           </a:p>
         </p:txBody>
       </p:sp>
@@ -10683,7 +11844,7 @@
                 <a:ea typeface="나눔스퀘어 ExtraBold" panose="020B0600000101010101" pitchFamily="50" charset="-127"/>
                 <a:cs typeface="Arial" panose="020B0604020202020204" pitchFamily="34" charset="0"/>
               </a:rPr>
-              <a:t>Rehearsal based approach</a:t>
+              <a:t>Architecture based approach</a:t>
             </a:r>
           </a:p>
         </p:txBody>
@@ -10726,7 +11887,33 @@
               <a:buFont typeface="Wingdings" panose="05000000000000000000" pitchFamily="2" charset="2"/>
               <a:buChar char="§"/>
             </a:pPr>
-            <a:endParaRPr lang="en-US" altLang="ko-KR" sz="1800" dirty="0">
+            <a:r>
+              <a:rPr lang="en-US" altLang="ko-KR" sz="2000" dirty="0">
+                <a:solidFill>
+                  <a:schemeClr val="tx1">
+                    <a:lumMod val="85000"/>
+                    <a:lumOff val="15000"/>
+                  </a:schemeClr>
+                </a:solidFill>
+                <a:latin typeface="나눔스퀘어 ExtraBold" panose="020B0600000101010101" pitchFamily="50" charset="-127"/>
+                <a:ea typeface="나눔스퀘어 ExtraBold" panose="020B0600000101010101" pitchFamily="50" charset="-127"/>
+                <a:cs typeface="Arial" panose="020B0604020202020204" pitchFamily="34" charset="0"/>
+              </a:rPr>
+              <a:t>FGN (Feature Graph Networks)</a:t>
+            </a:r>
+          </a:p>
+          <a:p>
+            <a:pPr marL="432000" indent="-432000">
+              <a:lnSpc>
+                <a:spcPct val="100000"/>
+              </a:lnSpc>
+              <a:buClr>
+                <a:srgbClr val="004F9E"/>
+              </a:buClr>
+              <a:buFont typeface="Wingdings" panose="05000000000000000000" pitchFamily="2" charset="2"/>
+              <a:buChar char="§"/>
+            </a:pPr>
+            <a:endParaRPr lang="en-US" altLang="ko-KR" sz="2000" dirty="0">
               <a:solidFill>
                 <a:schemeClr val="tx1">
                   <a:lumMod val="85000"/>
@@ -10738,6 +11925,28 @@
               <a:cs typeface="Arial" panose="020B0604020202020204" pitchFamily="34" charset="0"/>
             </a:endParaRPr>
           </a:p>
+          <a:p>
+            <a:pPr marL="0" indent="0">
+              <a:lnSpc>
+                <a:spcPct val="100000"/>
+              </a:lnSpc>
+              <a:buClr>
+                <a:srgbClr val="004F9E"/>
+              </a:buClr>
+              <a:buNone/>
+            </a:pPr>
+            <a:endParaRPr lang="en-US" altLang="ko-KR" sz="2000" dirty="0">
+              <a:solidFill>
+                <a:schemeClr val="tx1">
+                  <a:lumMod val="85000"/>
+                  <a:lumOff val="15000"/>
+                </a:schemeClr>
+              </a:solidFill>
+              <a:latin typeface="나눔스퀘어 ExtraBold" panose="020B0600000101010101" pitchFamily="50" charset="-127"/>
+              <a:ea typeface="나눔스퀘어 ExtraBold" panose="020B0600000101010101" pitchFamily="50" charset="-127"/>
+              <a:cs typeface="Arial" panose="020B0604020202020204" pitchFamily="34" charset="0"/>
+            </a:endParaRPr>
+          </a:p>
         </p:txBody>
       </p:sp>
       <p:sp>
@@ -10773,7 +11982,7 @@
     </p:spTree>
     <p:extLst>
       <p:ext uri="{BB962C8B-B14F-4D97-AF65-F5344CB8AC3E}">
-        <p14:creationId xmlns:p14="http://schemas.microsoft.com/office/powerpoint/2010/main" val="2888396295"/>
+        <p14:creationId xmlns:p14="http://schemas.microsoft.com/office/powerpoint/2010/main" val="500019753"/>
       </p:ext>
     </p:extLst>
   </p:cSld>
@@ -10845,7 +12054,7 @@
                 <a:ea typeface="나눔스퀘어 ExtraBold" panose="020B0600000101010101" pitchFamily="50" charset="-127"/>
                 <a:cs typeface="Arial" panose="020B0604020202020204" pitchFamily="34" charset="0"/>
               </a:rPr>
-              <a:t>Regularization based approach</a:t>
+              <a:t>Rehearsal(experience replay) based approach</a:t>
             </a:r>
           </a:p>
         </p:txBody>
@@ -10888,17 +12097,102 @@
               <a:buFont typeface="Wingdings" panose="05000000000000000000" pitchFamily="2" charset="2"/>
               <a:buChar char="§"/>
             </a:pPr>
-            <a:endParaRPr lang="en-US" altLang="ko-KR" sz="1800" dirty="0">
-              <a:solidFill>
-                <a:schemeClr val="tx1">
-                  <a:lumMod val="85000"/>
-                  <a:lumOff val="15000"/>
-                </a:schemeClr>
-              </a:solidFill>
-              <a:latin typeface="나눔스퀘어 ExtraBold" panose="020B0600000101010101" pitchFamily="50" charset="-127"/>
-              <a:ea typeface="나눔스퀘어 ExtraBold" panose="020B0600000101010101" pitchFamily="50" charset="-127"/>
-              <a:cs typeface="Arial" panose="020B0604020202020204" pitchFamily="34" charset="0"/>
-            </a:endParaRPr>
+            <a:r>
+              <a:rPr lang="en-US" altLang="ko-KR" sz="2000" dirty="0">
+                <a:solidFill>
+                  <a:schemeClr val="tx1">
+                    <a:lumMod val="85000"/>
+                    <a:lumOff val="15000"/>
+                  </a:schemeClr>
+                </a:solidFill>
+                <a:latin typeface="나눔스퀘어 ExtraBold" panose="020B0600000101010101" pitchFamily="50" charset="-127"/>
+                <a:ea typeface="나눔스퀘어 ExtraBold" panose="020B0600000101010101" pitchFamily="50" charset="-127"/>
+                <a:cs typeface="Arial" panose="020B0604020202020204" pitchFamily="34" charset="0"/>
+              </a:rPr>
+              <a:t>This approach regulates retraining processes for previous tasks to strengthen the relationship between memory and performance on previously learned tasks</a:t>
+            </a:r>
+          </a:p>
+          <a:p>
+            <a:pPr marL="432000" indent="-432000">
+              <a:lnSpc>
+                <a:spcPct val="100000"/>
+              </a:lnSpc>
+              <a:buClr>
+                <a:srgbClr val="004F9E"/>
+              </a:buClr>
+              <a:buFont typeface="Wingdings" panose="05000000000000000000" pitchFamily="2" charset="2"/>
+              <a:buChar char="§"/>
+            </a:pPr>
+            <a:r>
+              <a:rPr lang="en-US" altLang="ko-KR" sz="2000" dirty="0">
+                <a:solidFill>
+                  <a:schemeClr val="tx1">
+                    <a:lumMod val="85000"/>
+                    <a:lumOff val="15000"/>
+                  </a:schemeClr>
+                </a:solidFill>
+                <a:latin typeface="나눔스퀘어 ExtraBold" panose="020B0600000101010101" pitchFamily="50" charset="-127"/>
+                <a:ea typeface="나눔스퀘어 ExtraBold" panose="020B0600000101010101" pitchFamily="50" charset="-127"/>
+                <a:cs typeface="Arial" panose="020B0604020202020204" pitchFamily="34" charset="0"/>
+              </a:rPr>
+              <a:t>This graph learning approach enables the selection of </a:t>
+            </a:r>
+            <a:r>
+              <a:rPr lang="en-US" altLang="ko-KR" sz="2000" b="1" dirty="0">
+                <a:solidFill>
+                  <a:schemeClr val="tx1">
+                    <a:lumMod val="85000"/>
+                    <a:lumOff val="15000"/>
+                  </a:schemeClr>
+                </a:solidFill>
+                <a:latin typeface="나눔스퀘어 ExtraBold" panose="020B0600000101010101" pitchFamily="50" charset="-127"/>
+                <a:ea typeface="나눔스퀘어 ExtraBold" panose="020B0600000101010101" pitchFamily="50" charset="-127"/>
+                <a:cs typeface="Arial" panose="020B0604020202020204" pitchFamily="34" charset="0"/>
+              </a:rPr>
+              <a:t>appropriate samples </a:t>
+            </a:r>
+            <a:r>
+              <a:rPr lang="en-US" altLang="ko-KR" sz="2000" dirty="0">
+                <a:solidFill>
+                  <a:schemeClr val="tx1">
+                    <a:lumMod val="85000"/>
+                    <a:lumOff val="15000"/>
+                  </a:schemeClr>
+                </a:solidFill>
+                <a:latin typeface="나눔스퀘어 ExtraBold" panose="020B0600000101010101" pitchFamily="50" charset="-127"/>
+                <a:ea typeface="나눔스퀘어 ExtraBold" panose="020B0600000101010101" pitchFamily="50" charset="-127"/>
+                <a:cs typeface="Arial" panose="020B0604020202020204" pitchFamily="34" charset="0"/>
+              </a:rPr>
+              <a:t>of graph representation, such as nodes and edges, </a:t>
+            </a:r>
+            <a:r>
+              <a:rPr lang="en-US" altLang="ko-KR" sz="2000" b="1" dirty="0">
+                <a:solidFill>
+                  <a:schemeClr val="tx1">
+                    <a:lumMod val="85000"/>
+                    <a:lumOff val="15000"/>
+                  </a:schemeClr>
+                </a:solidFill>
+                <a:latin typeface="나눔스퀘어 ExtraBold" panose="020B0600000101010101" pitchFamily="50" charset="-127"/>
+                <a:ea typeface="나눔스퀘어 ExtraBold" panose="020B0600000101010101" pitchFamily="50" charset="-127"/>
+                <a:cs typeface="Arial" panose="020B0604020202020204" pitchFamily="34" charset="0"/>
+              </a:rPr>
+              <a:t>for retraining purposes</a:t>
+            </a:r>
+            <a:r>
+              <a:rPr lang="en-US" altLang="ko-KR" sz="2000" dirty="0">
+                <a:solidFill>
+                  <a:schemeClr val="tx1">
+                    <a:lumMod val="85000"/>
+                    <a:lumOff val="15000"/>
+                  </a:schemeClr>
+                </a:solidFill>
+                <a:latin typeface="나눔스퀘어 ExtraBold" panose="020B0600000101010101" pitchFamily="50" charset="-127"/>
+                <a:ea typeface="나눔스퀘어 ExtraBold" panose="020B0600000101010101" pitchFamily="50" charset="-127"/>
+                <a:cs typeface="Arial" panose="020B0604020202020204" pitchFamily="34" charset="0"/>
+              </a:rPr>
+              <a:t>.</a:t>
+            </a:r>
           </a:p>
         </p:txBody>
       </p:sp>
@@ -10935,7 +12229,7 @@
     </p:spTree>
     <p:extLst>
       <p:ext uri="{BB962C8B-B14F-4D97-AF65-F5344CB8AC3E}">
-        <p14:creationId xmlns:p14="http://schemas.microsoft.com/office/powerpoint/2010/main" val="2473855550"/>
+        <p14:creationId xmlns:p14="http://schemas.microsoft.com/office/powerpoint/2010/main" val="2888396295"/>
       </p:ext>
     </p:extLst>
   </p:cSld>

</xml_diff>